<commit_message>
add Hamish resources, write draft speech notes, add in example slides to PowerPoint
</commit_message>
<xml_diff>
--- a/Report Writing & Referencing.pptx
+++ b/Report Writing & Referencing.pptx
@@ -16,14 +16,18 @@
     <p:sldId id="278" r:id="rId10"/>
     <p:sldId id="279" r:id="rId11"/>
     <p:sldId id="280" r:id="rId12"/>
-    <p:sldId id="266" r:id="rId13"/>
-    <p:sldId id="267" r:id="rId14"/>
-    <p:sldId id="268" r:id="rId15"/>
-    <p:sldId id="270" r:id="rId16"/>
-    <p:sldId id="269" r:id="rId17"/>
-    <p:sldId id="272" r:id="rId18"/>
-    <p:sldId id="273" r:id="rId19"/>
-    <p:sldId id="271" r:id="rId20"/>
+    <p:sldId id="283" r:id="rId13"/>
+    <p:sldId id="266" r:id="rId14"/>
+    <p:sldId id="267" r:id="rId15"/>
+    <p:sldId id="268" r:id="rId16"/>
+    <p:sldId id="270" r:id="rId17"/>
+    <p:sldId id="285" r:id="rId18"/>
+    <p:sldId id="269" r:id="rId19"/>
+    <p:sldId id="286" r:id="rId20"/>
+    <p:sldId id="272" r:id="rId21"/>
+    <p:sldId id="273" r:id="rId22"/>
+    <p:sldId id="271" r:id="rId23"/>
+    <p:sldId id="284" r:id="rId24"/>
   </p:sldIdLst>
   <p:sldSz cx="12192000" cy="6858000"/>
   <p:notesSz cx="6858000" cy="9144000"/>
@@ -122,6 +126,11 @@
       </a:defRPr>
     </a:lvl9pPr>
   </p:defaultTextStyle>
+  <p:extLst>
+    <p:ext uri="{EFAFB233-063F-42B5-8137-9DF3F51BA10A}">
+      <p15:sldGuideLst xmlns:p15="http://schemas.microsoft.com/office/powerpoint/2012/main"/>
+    </p:ext>
+  </p:extLst>
 </p:presentation>
 </file>
 
@@ -8325,7 +8334,7 @@
           <a:p>
             <a:fld id="{8A1355D6-7C9A-4EBD-B0D0-CA9BF0B6F861}" type="datetimeFigureOut">
               <a:rPr lang="en-NZ" smtClean="0"/>
-              <a:t>27/05/2023</a:t>
+              <a:t>29/05/2023</a:t>
             </a:fld>
             <a:endParaRPr lang="en-NZ"/>
           </a:p>
@@ -8525,7 +8534,7 @@
           <a:p>
             <a:fld id="{8A1355D6-7C9A-4EBD-B0D0-CA9BF0B6F861}" type="datetimeFigureOut">
               <a:rPr lang="en-NZ" smtClean="0"/>
-              <a:t>27/05/2023</a:t>
+              <a:t>29/05/2023</a:t>
             </a:fld>
             <a:endParaRPr lang="en-NZ"/>
           </a:p>
@@ -8735,7 +8744,7 @@
           <a:p>
             <a:fld id="{8A1355D6-7C9A-4EBD-B0D0-CA9BF0B6F861}" type="datetimeFigureOut">
               <a:rPr lang="en-NZ" smtClean="0"/>
-              <a:t>27/05/2023</a:t>
+              <a:t>29/05/2023</a:t>
             </a:fld>
             <a:endParaRPr lang="en-NZ"/>
           </a:p>
@@ -8935,7 +8944,7 @@
           <a:p>
             <a:fld id="{8A1355D6-7C9A-4EBD-B0D0-CA9BF0B6F861}" type="datetimeFigureOut">
               <a:rPr lang="en-NZ" smtClean="0"/>
-              <a:t>27/05/2023</a:t>
+              <a:t>29/05/2023</a:t>
             </a:fld>
             <a:endParaRPr lang="en-NZ"/>
           </a:p>
@@ -9211,7 +9220,7 @@
           <a:p>
             <a:fld id="{8A1355D6-7C9A-4EBD-B0D0-CA9BF0B6F861}" type="datetimeFigureOut">
               <a:rPr lang="en-NZ" smtClean="0"/>
-              <a:t>27/05/2023</a:t>
+              <a:t>29/05/2023</a:t>
             </a:fld>
             <a:endParaRPr lang="en-NZ"/>
           </a:p>
@@ -9479,7 +9488,7 @@
           <a:p>
             <a:fld id="{8A1355D6-7C9A-4EBD-B0D0-CA9BF0B6F861}" type="datetimeFigureOut">
               <a:rPr lang="en-NZ" smtClean="0"/>
-              <a:t>27/05/2023</a:t>
+              <a:t>29/05/2023</a:t>
             </a:fld>
             <a:endParaRPr lang="en-NZ"/>
           </a:p>
@@ -9894,7 +9903,7 @@
           <a:p>
             <a:fld id="{8A1355D6-7C9A-4EBD-B0D0-CA9BF0B6F861}" type="datetimeFigureOut">
               <a:rPr lang="en-NZ" smtClean="0"/>
-              <a:t>27/05/2023</a:t>
+              <a:t>29/05/2023</a:t>
             </a:fld>
             <a:endParaRPr lang="en-NZ"/>
           </a:p>
@@ -10036,7 +10045,7 @@
           <a:p>
             <a:fld id="{8A1355D6-7C9A-4EBD-B0D0-CA9BF0B6F861}" type="datetimeFigureOut">
               <a:rPr lang="en-NZ" smtClean="0"/>
-              <a:t>27/05/2023</a:t>
+              <a:t>29/05/2023</a:t>
             </a:fld>
             <a:endParaRPr lang="en-NZ"/>
           </a:p>
@@ -10149,7 +10158,7 @@
           <a:p>
             <a:fld id="{8A1355D6-7C9A-4EBD-B0D0-CA9BF0B6F861}" type="datetimeFigureOut">
               <a:rPr lang="en-NZ" smtClean="0"/>
-              <a:t>27/05/2023</a:t>
+              <a:t>29/05/2023</a:t>
             </a:fld>
             <a:endParaRPr lang="en-NZ"/>
           </a:p>
@@ -10462,7 +10471,7 @@
           <a:p>
             <a:fld id="{8A1355D6-7C9A-4EBD-B0D0-CA9BF0B6F861}" type="datetimeFigureOut">
               <a:rPr lang="en-NZ" smtClean="0"/>
-              <a:t>27/05/2023</a:t>
+              <a:t>29/05/2023</a:t>
             </a:fld>
             <a:endParaRPr lang="en-NZ"/>
           </a:p>
@@ -10751,7 +10760,7 @@
           <a:p>
             <a:fld id="{8A1355D6-7C9A-4EBD-B0D0-CA9BF0B6F861}" type="datetimeFigureOut">
               <a:rPr lang="en-NZ" smtClean="0"/>
-              <a:t>27/05/2023</a:t>
+              <a:t>29/05/2023</a:t>
             </a:fld>
             <a:endParaRPr lang="en-NZ"/>
           </a:p>
@@ -10994,7 +11003,7 @@
           <a:p>
             <a:fld id="{8A1355D6-7C9A-4EBD-B0D0-CA9BF0B6F861}" type="datetimeFigureOut">
               <a:rPr lang="en-NZ" smtClean="0"/>
-              <a:t>27/05/2023</a:t>
+              <a:t>29/05/2023</a:t>
             </a:fld>
             <a:endParaRPr lang="en-NZ"/>
           </a:p>
@@ -13502,10 +13511,10 @@
       </p:grpSpPr>
       <p:sp useBgFill="1">
         <p:nvSpPr>
-          <p:cNvPr id="9" name="Rectangle 8">
+          <p:cNvPr id="64" name="Rectangle 63">
             <a:extLst>
               <a:ext uri="{FF2B5EF4-FFF2-40B4-BE49-F238E27FC236}">
-                <a16:creationId xmlns:a16="http://schemas.microsoft.com/office/drawing/2014/main" id="{BACC6370-2D7E-4714-9D71-7542949D7D5D}"/>
+                <a16:creationId xmlns:a16="http://schemas.microsoft.com/office/drawing/2014/main" id="{A4E37431-20F0-4DD6-84A9-ED2B644943A2}"/>
               </a:ext>
               <a:ext uri="{C183D7F6-B498-43B3-948B-1728B52AA6E4}">
                 <adec:decorative xmlns:adec="http://schemas.microsoft.com/office/drawing/2017/decorative" val="1"/>
@@ -13578,6 +13587,709 @@
       </p:sp>
       <p:sp>
         <p:nvSpPr>
+          <p:cNvPr id="66" name="Rectangle 65">
+            <a:extLst>
+              <a:ext uri="{FF2B5EF4-FFF2-40B4-BE49-F238E27FC236}">
+                <a16:creationId xmlns:a16="http://schemas.microsoft.com/office/drawing/2014/main" id="{0AE98B72-66C6-4AB4-AF0D-BA830DE86393}"/>
+              </a:ext>
+              <a:ext uri="{C183D7F6-B498-43B3-948B-1728B52AA6E4}">
+                <adec:decorative xmlns:adec="http://schemas.microsoft.com/office/drawing/2017/decorative" val="1"/>
+              </a:ext>
+            </a:extLst>
+          </p:cNvPr>
+          <p:cNvSpPr>
+            <a:spLocks noGrp="1" noRot="1" noChangeAspect="1" noMove="1" noResize="1" noEditPoints="1" noAdjustHandles="1" noChangeArrowheads="1" noChangeShapeType="1" noTextEdit="1"/>
+          </p:cNvSpPr>
+          <p:nvPr>
+            <p:extLst>
+              <p:ext uri="{386F3935-93C4-4BCD-93E2-E3B085C9AB24}">
+                <p16:designElem xmlns:p16="http://schemas.microsoft.com/office/powerpoint/2015/main" val="1"/>
+              </p:ext>
+            </p:extLst>
+          </p:nvPr>
+        </p:nvSpPr>
+        <p:spPr>
+          <a:xfrm rot="5400000" flipH="1">
+            <a:off x="-638515" y="639280"/>
+            <a:ext cx="6858000" cy="5579440"/>
+          </a:xfrm>
+          <a:prstGeom prst="rect">
+            <a:avLst/>
+          </a:prstGeom>
+          <a:gradFill>
+            <a:gsLst>
+              <a:gs pos="8000">
+                <a:srgbClr val="000000"/>
+              </a:gs>
+              <a:gs pos="100000">
+                <a:schemeClr val="accent1">
+                  <a:lumMod val="75000"/>
+                </a:schemeClr>
+              </a:gs>
+            </a:gsLst>
+            <a:lin ang="3000000" scaled="0"/>
+          </a:gradFill>
+          <a:ln>
+            <a:noFill/>
+          </a:ln>
+        </p:spPr>
+        <p:style>
+          <a:lnRef idx="2">
+            <a:schemeClr val="accent1">
+              <a:shade val="50000"/>
+            </a:schemeClr>
+          </a:lnRef>
+          <a:fillRef idx="1">
+            <a:schemeClr val="accent1"/>
+          </a:fillRef>
+          <a:effectRef idx="0">
+            <a:schemeClr val="accent1"/>
+          </a:effectRef>
+          <a:fontRef idx="minor">
+            <a:schemeClr val="lt1"/>
+          </a:fontRef>
+        </p:style>
+        <p:txBody>
+          <a:bodyPr rtlCol="0" anchor="ctr"/>
+          <a:lstStyle/>
+          <a:p>
+            <a:pPr algn="ctr"/>
+            <a:endParaRPr lang="en-US"/>
+          </a:p>
+        </p:txBody>
+      </p:sp>
+      <p:sp>
+        <p:nvSpPr>
+          <p:cNvPr id="68" name="Rectangle 67">
+            <a:extLst>
+              <a:ext uri="{FF2B5EF4-FFF2-40B4-BE49-F238E27FC236}">
+                <a16:creationId xmlns:a16="http://schemas.microsoft.com/office/drawing/2014/main" id="{407EAFC6-733F-403D-BB4D-05A3A28742F1}"/>
+              </a:ext>
+              <a:ext uri="{C183D7F6-B498-43B3-948B-1728B52AA6E4}">
+                <adec:decorative xmlns:adec="http://schemas.microsoft.com/office/drawing/2017/decorative" val="1"/>
+              </a:ext>
+            </a:extLst>
+          </p:cNvPr>
+          <p:cNvSpPr>
+            <a:spLocks noGrp="1" noRot="1" noChangeAspect="1" noMove="1" noResize="1" noEditPoints="1" noAdjustHandles="1" noChangeArrowheads="1" noChangeShapeType="1" noTextEdit="1"/>
+          </p:cNvSpPr>
+          <p:nvPr>
+            <p:extLst>
+              <p:ext uri="{386F3935-93C4-4BCD-93E2-E3B085C9AB24}">
+                <p16:designElem xmlns:p16="http://schemas.microsoft.com/office/powerpoint/2015/main" val="1"/>
+              </p:ext>
+            </p:extLst>
+          </p:nvPr>
+        </p:nvSpPr>
+        <p:spPr>
+          <a:xfrm rot="5400000" flipH="1">
+            <a:off x="-393206" y="395206"/>
+            <a:ext cx="6346209" cy="5576080"/>
+          </a:xfrm>
+          <a:prstGeom prst="rect">
+            <a:avLst/>
+          </a:prstGeom>
+          <a:gradFill>
+            <a:gsLst>
+              <a:gs pos="0">
+                <a:srgbClr val="000000">
+                  <a:alpha val="0"/>
+                </a:srgbClr>
+              </a:gs>
+              <a:gs pos="99000">
+                <a:schemeClr val="accent1">
+                  <a:alpha val="0"/>
+                </a:schemeClr>
+              </a:gs>
+            </a:gsLst>
+            <a:lin ang="1800000" scaled="0"/>
+          </a:gradFill>
+          <a:ln>
+            <a:noFill/>
+          </a:ln>
+        </p:spPr>
+        <p:style>
+          <a:lnRef idx="2">
+            <a:schemeClr val="accent1">
+              <a:shade val="50000"/>
+            </a:schemeClr>
+          </a:lnRef>
+          <a:fillRef idx="1">
+            <a:schemeClr val="accent1"/>
+          </a:fillRef>
+          <a:effectRef idx="0">
+            <a:schemeClr val="accent1"/>
+          </a:effectRef>
+          <a:fontRef idx="minor">
+            <a:schemeClr val="lt1"/>
+          </a:fontRef>
+        </p:style>
+        <p:txBody>
+          <a:bodyPr rtlCol="0" anchor="ctr"/>
+          <a:lstStyle/>
+          <a:p>
+            <a:pPr algn="ctr"/>
+            <a:endParaRPr lang="en-US"/>
+          </a:p>
+        </p:txBody>
+      </p:sp>
+      <p:sp>
+        <p:nvSpPr>
+          <p:cNvPr id="70" name="Rectangle 69">
+            <a:extLst>
+              <a:ext uri="{FF2B5EF4-FFF2-40B4-BE49-F238E27FC236}">
+                <a16:creationId xmlns:a16="http://schemas.microsoft.com/office/drawing/2014/main" id="{17A36730-4CB0-4F61-AD11-A44C9765833F}"/>
+              </a:ext>
+              <a:ext uri="{C183D7F6-B498-43B3-948B-1728B52AA6E4}">
+                <adec:decorative xmlns:adec="http://schemas.microsoft.com/office/drawing/2017/decorative" val="1"/>
+              </a:ext>
+            </a:extLst>
+          </p:cNvPr>
+          <p:cNvSpPr>
+            <a:spLocks noGrp="1" noRot="1" noChangeAspect="1" noMove="1" noResize="1" noEditPoints="1" noAdjustHandles="1" noChangeArrowheads="1" noChangeShapeType="1" noTextEdit="1"/>
+          </p:cNvSpPr>
+          <p:nvPr>
+            <p:extLst>
+              <p:ext uri="{386F3935-93C4-4BCD-93E2-E3B085C9AB24}">
+                <p16:designElem xmlns:p16="http://schemas.microsoft.com/office/powerpoint/2015/main" val="1"/>
+              </p:ext>
+            </p:extLst>
+          </p:nvPr>
+        </p:nvSpPr>
+        <p:spPr>
+          <a:xfrm rot="5400000" flipH="1">
+            <a:off x="1528907" y="2818967"/>
+            <a:ext cx="2501979" cy="5576080"/>
+          </a:xfrm>
+          <a:prstGeom prst="rect">
+            <a:avLst/>
+          </a:prstGeom>
+          <a:gradFill>
+            <a:gsLst>
+              <a:gs pos="2000">
+                <a:schemeClr val="accent1">
+                  <a:alpha val="29000"/>
+                </a:schemeClr>
+              </a:gs>
+              <a:gs pos="100000">
+                <a:srgbClr val="000000">
+                  <a:alpha val="30000"/>
+                </a:srgbClr>
+              </a:gs>
+            </a:gsLst>
+            <a:lin ang="7800000" scaled="0"/>
+          </a:gradFill>
+          <a:ln>
+            <a:noFill/>
+          </a:ln>
+        </p:spPr>
+        <p:style>
+          <a:lnRef idx="2">
+            <a:schemeClr val="accent1">
+              <a:shade val="50000"/>
+            </a:schemeClr>
+          </a:lnRef>
+          <a:fillRef idx="1">
+            <a:schemeClr val="accent1"/>
+          </a:fillRef>
+          <a:effectRef idx="0">
+            <a:schemeClr val="accent1"/>
+          </a:effectRef>
+          <a:fontRef idx="minor">
+            <a:schemeClr val="lt1"/>
+          </a:fontRef>
+        </p:style>
+        <p:txBody>
+          <a:bodyPr rtlCol="0" anchor="ctr"/>
+          <a:lstStyle/>
+          <a:p>
+            <a:pPr algn="ctr"/>
+            <a:endParaRPr lang="en-US" dirty="0"/>
+          </a:p>
+        </p:txBody>
+      </p:sp>
+      <p:sp>
+        <p:nvSpPr>
+          <p:cNvPr id="72" name="Rectangle 71">
+            <a:extLst>
+              <a:ext uri="{FF2B5EF4-FFF2-40B4-BE49-F238E27FC236}">
+                <a16:creationId xmlns:a16="http://schemas.microsoft.com/office/drawing/2014/main" id="{C69C79E1-F916-4929-A4F3-DE763D4BFA57}"/>
+              </a:ext>
+              <a:ext uri="{C183D7F6-B498-43B3-948B-1728B52AA6E4}">
+                <adec:decorative xmlns:adec="http://schemas.microsoft.com/office/drawing/2017/decorative" val="1"/>
+              </a:ext>
+            </a:extLst>
+          </p:cNvPr>
+          <p:cNvSpPr>
+            <a:spLocks noGrp="1" noRot="1" noChangeAspect="1" noMove="1" noResize="1" noEditPoints="1" noAdjustHandles="1" noChangeArrowheads="1" noChangeShapeType="1" noTextEdit="1"/>
+          </p:cNvSpPr>
+          <p:nvPr>
+            <p:extLst>
+              <p:ext uri="{386F3935-93C4-4BCD-93E2-E3B085C9AB24}">
+                <p16:designElem xmlns:p16="http://schemas.microsoft.com/office/powerpoint/2015/main" val="1"/>
+              </p:ext>
+            </p:extLst>
+          </p:nvPr>
+        </p:nvSpPr>
+        <p:spPr>
+          <a:xfrm rot="5400000" flipH="1">
+            <a:off x="-425002" y="852793"/>
+            <a:ext cx="6858001" cy="5152412"/>
+          </a:xfrm>
+          <a:prstGeom prst="rect">
+            <a:avLst/>
+          </a:prstGeom>
+          <a:gradFill>
+            <a:gsLst>
+              <a:gs pos="0">
+                <a:srgbClr val="000000">
+                  <a:alpha val="0"/>
+                </a:srgbClr>
+              </a:gs>
+              <a:gs pos="99000">
+                <a:schemeClr val="accent1">
+                  <a:alpha val="11000"/>
+                </a:schemeClr>
+              </a:gs>
+            </a:gsLst>
+            <a:lin ang="7800000" scaled="0"/>
+          </a:gradFill>
+          <a:ln>
+            <a:noFill/>
+          </a:ln>
+        </p:spPr>
+        <p:style>
+          <a:lnRef idx="2">
+            <a:schemeClr val="accent1">
+              <a:shade val="50000"/>
+            </a:schemeClr>
+          </a:lnRef>
+          <a:fillRef idx="1">
+            <a:schemeClr val="accent1"/>
+          </a:fillRef>
+          <a:effectRef idx="0">
+            <a:schemeClr val="accent1"/>
+          </a:effectRef>
+          <a:fontRef idx="minor">
+            <a:schemeClr val="lt1"/>
+          </a:fontRef>
+        </p:style>
+        <p:txBody>
+          <a:bodyPr rtlCol="0" anchor="ctr"/>
+          <a:lstStyle/>
+          <a:p>
+            <a:pPr algn="ctr"/>
+            <a:endParaRPr lang="en-US"/>
+          </a:p>
+        </p:txBody>
+      </p:sp>
+      <p:sp>
+        <p:nvSpPr>
+          <p:cNvPr id="74" name="Oval 73">
+            <a:extLst>
+              <a:ext uri="{FF2B5EF4-FFF2-40B4-BE49-F238E27FC236}">
+                <a16:creationId xmlns:a16="http://schemas.microsoft.com/office/drawing/2014/main" id="{767334AB-16BD-4EC7-8C6B-4B5171600933}"/>
+              </a:ext>
+              <a:ext uri="{C183D7F6-B498-43B3-948B-1728B52AA6E4}">
+                <adec:decorative xmlns:adec="http://schemas.microsoft.com/office/drawing/2017/decorative" val="1"/>
+              </a:ext>
+            </a:extLst>
+          </p:cNvPr>
+          <p:cNvSpPr>
+            <a:spLocks noGrp="1" noRot="1" noChangeAspect="1" noMove="1" noResize="1" noEditPoints="1" noAdjustHandles="1" noChangeArrowheads="1" noChangeShapeType="1" noTextEdit="1"/>
+          </p:cNvSpPr>
+          <p:nvPr>
+            <p:extLst>
+              <p:ext uri="{386F3935-93C4-4BCD-93E2-E3B085C9AB24}">
+                <p16:designElem xmlns:p16="http://schemas.microsoft.com/office/powerpoint/2015/main" val="1"/>
+              </p:ext>
+            </p:extLst>
+          </p:nvPr>
+        </p:nvSpPr>
+        <p:spPr>
+          <a:xfrm rot="6097846">
+            <a:off x="818753" y="1128497"/>
+            <a:ext cx="4318303" cy="4318303"/>
+          </a:xfrm>
+          <a:prstGeom prst="ellipse">
+            <a:avLst/>
+          </a:prstGeom>
+          <a:gradFill>
+            <a:gsLst>
+              <a:gs pos="39000">
+                <a:schemeClr val="accent1">
+                  <a:alpha val="0"/>
+                </a:schemeClr>
+              </a:gs>
+              <a:gs pos="100000">
+                <a:schemeClr val="accent1">
+                  <a:lumMod val="60000"/>
+                  <a:lumOff val="40000"/>
+                  <a:alpha val="15000"/>
+                </a:schemeClr>
+              </a:gs>
+            </a:gsLst>
+            <a:lin ang="17400000" scaled="0"/>
+          </a:gradFill>
+          <a:ln>
+            <a:noFill/>
+          </a:ln>
+        </p:spPr>
+        <p:style>
+          <a:lnRef idx="2">
+            <a:schemeClr val="accent1">
+              <a:shade val="50000"/>
+            </a:schemeClr>
+          </a:lnRef>
+          <a:fillRef idx="1">
+            <a:schemeClr val="accent1"/>
+          </a:fillRef>
+          <a:effectRef idx="0">
+            <a:schemeClr val="accent1"/>
+          </a:effectRef>
+          <a:fontRef idx="minor">
+            <a:schemeClr val="lt1"/>
+          </a:fontRef>
+        </p:style>
+        <p:txBody>
+          <a:bodyPr rtlCol="0" anchor="ctr"/>
+          <a:lstStyle/>
+          <a:p>
+            <a:pPr algn="ctr"/>
+            <a:endParaRPr lang="en-US" dirty="0"/>
+          </a:p>
+        </p:txBody>
+      </p:sp>
+      <p:sp>
+        <p:nvSpPr>
+          <p:cNvPr id="2" name="Title 1">
+            <a:extLst>
+              <a:ext uri="{FF2B5EF4-FFF2-40B4-BE49-F238E27FC236}">
+                <a16:creationId xmlns:a16="http://schemas.microsoft.com/office/drawing/2014/main" id="{D1BDCD89-2AB9-76AB-DE0D-D5B2DDA6B01B}"/>
+              </a:ext>
+            </a:extLst>
+          </p:cNvPr>
+          <p:cNvSpPr>
+            <a:spLocks noGrp="1"/>
+          </p:cNvSpPr>
+          <p:nvPr>
+            <p:ph type="title"/>
+          </p:nvPr>
+        </p:nvSpPr>
+        <p:spPr>
+          <a:xfrm>
+            <a:off x="660042" y="891652"/>
+            <a:ext cx="4669340" cy="3030724"/>
+          </a:xfrm>
+        </p:spPr>
+        <p:txBody>
+          <a:bodyPr vert="horz" lIns="91440" tIns="45720" rIns="91440" bIns="45720" rtlCol="0" anchor="b">
+            <a:normAutofit/>
+          </a:bodyPr>
+          <a:lstStyle/>
+          <a:p>
+            <a:pPr algn="r"/>
+            <a:r>
+              <a:rPr lang="en-US" sz="4000" kern="1200" dirty="0">
+                <a:solidFill>
+                  <a:srgbClr val="FFFFFF"/>
+                </a:solidFill>
+                <a:latin typeface="+mj-lt"/>
+                <a:ea typeface="+mj-ea"/>
+                <a:cs typeface="+mj-cs"/>
+              </a:rPr>
+              <a:t>Academic Reports vs. Technical Reports</a:t>
+            </a:r>
+          </a:p>
+        </p:txBody>
+      </p:sp>
+      <p:pic>
+        <p:nvPicPr>
+          <p:cNvPr id="7" name="Content Placeholder 6" descr="Document">
+            <a:extLst>
+              <a:ext uri="{FF2B5EF4-FFF2-40B4-BE49-F238E27FC236}">
+                <a16:creationId xmlns:a16="http://schemas.microsoft.com/office/drawing/2014/main" id="{51155D47-03B1-71EA-3C5B-E76256E17A21}"/>
+              </a:ext>
+            </a:extLst>
+          </p:cNvPr>
+          <p:cNvPicPr>
+            <a:picLocks noGrp="1" noChangeAspect="1"/>
+          </p:cNvPicPr>
+          <p:nvPr>
+            <p:ph idx="1"/>
+          </p:nvPr>
+        </p:nvPicPr>
+        <p:blipFill>
+          <a:blip r:embed="rId2">
+            <a:extLst>
+              <a:ext uri="{28A0092B-C50C-407E-A947-70E740481C1C}">
+                <a14:useLocalDpi xmlns:a14="http://schemas.microsoft.com/office/drawing/2010/main" val="0"/>
+              </a:ext>
+              <a:ext uri="{96DAC541-7B7A-43D3-8B79-37D633B846F1}">
+                <asvg:svgBlip xmlns:asvg="http://schemas.microsoft.com/office/drawing/2016/SVG/main" r:embed="rId3"/>
+              </a:ext>
+            </a:extLst>
+          </a:blip>
+          <a:stretch>
+            <a:fillRect/>
+          </a:stretch>
+        </p:blipFill>
+        <p:spPr>
+          <a:xfrm>
+            <a:off x="6096000" y="602615"/>
+            <a:ext cx="5608320" cy="5608320"/>
+          </a:xfrm>
+          <a:prstGeom prst="rect">
+            <a:avLst/>
+          </a:prstGeom>
+        </p:spPr>
+      </p:pic>
+    </p:spTree>
+    <p:extLst>
+      <p:ext uri="{BB962C8B-B14F-4D97-AF65-F5344CB8AC3E}">
+        <p14:creationId xmlns:p14="http://schemas.microsoft.com/office/powerpoint/2010/main" val="1086368950"/>
+      </p:ext>
+    </p:extLst>
+  </p:cSld>
+  <p:clrMapOvr>
+    <a:masterClrMapping/>
+  </p:clrMapOvr>
+  <p:timing>
+    <p:tnLst>
+      <p:par>
+        <p:cTn id="1" dur="indefinite" restart="never" nodeType="tmRoot">
+          <p:childTnLst>
+            <p:seq concurrent="1" nextAc="seek">
+              <p:cTn id="2" dur="indefinite" nodeType="mainSeq">
+                <p:childTnLst>
+                  <p:par>
+                    <p:cTn id="3" fill="hold">
+                      <p:stCondLst>
+                        <p:cond delay="indefinite"/>
+                        <p:cond evt="onBegin" delay="0">
+                          <p:tn val="2"/>
+                        </p:cond>
+                      </p:stCondLst>
+                      <p:childTnLst>
+                        <p:par>
+                          <p:cTn id="4" fill="hold">
+                            <p:stCondLst>
+                              <p:cond delay="0"/>
+                            </p:stCondLst>
+                            <p:childTnLst>
+                              <p:par>
+                                <p:cTn id="5" presetID="10" presetClass="entr" presetSubtype="0" fill="hold" nodeType="withEffect">
+                                  <p:stCondLst>
+                                    <p:cond delay="500"/>
+                                  </p:stCondLst>
+                                  <p:iterate>
+                                    <p:tmPct val="10000"/>
+                                  </p:iterate>
+                                  <p:childTnLst>
+                                    <p:set>
+                                      <p:cBhvr>
+                                        <p:cTn id="6" dur="1" fill="hold">
+                                          <p:stCondLst>
+                                            <p:cond delay="0"/>
+                                          </p:stCondLst>
+                                        </p:cTn>
+                                        <p:tgtEl>
+                                          <p:spTgt spid="7"/>
+                                        </p:tgtEl>
+                                        <p:attrNameLst>
+                                          <p:attrName>style.visibility</p:attrName>
+                                        </p:attrNameLst>
+                                      </p:cBhvr>
+                                      <p:to>
+                                        <p:strVal val="visible"/>
+                                      </p:to>
+                                    </p:set>
+                                    <p:animEffect transition="in" filter="fade">
+                                      <p:cBhvr>
+                                        <p:cTn id="7" dur="700"/>
+                                        <p:tgtEl>
+                                          <p:spTgt spid="7"/>
+                                        </p:tgtEl>
+                                      </p:cBhvr>
+                                    </p:animEffect>
+                                  </p:childTnLst>
+                                </p:cTn>
+                              </p:par>
+                              <p:par>
+                                <p:cTn id="8" presetID="10" presetClass="entr" presetSubtype="0" fill="hold" grpId="0" nodeType="withEffect">
+                                  <p:stCondLst>
+                                    <p:cond delay="1000"/>
+                                  </p:stCondLst>
+                                  <p:iterate>
+                                    <p:tmPct val="10000"/>
+                                  </p:iterate>
+                                  <p:childTnLst>
+                                    <p:set>
+                                      <p:cBhvr>
+                                        <p:cTn id="9" dur="1" fill="hold">
+                                          <p:stCondLst>
+                                            <p:cond delay="0"/>
+                                          </p:stCondLst>
+                                        </p:cTn>
+                                        <p:tgtEl>
+                                          <p:spTgt spid="2"/>
+                                        </p:tgtEl>
+                                        <p:attrNameLst>
+                                          <p:attrName>style.visibility</p:attrName>
+                                        </p:attrNameLst>
+                                      </p:cBhvr>
+                                      <p:to>
+                                        <p:strVal val="visible"/>
+                                      </p:to>
+                                    </p:set>
+                                    <p:animEffect transition="in" filter="fade">
+                                      <p:cBhvr>
+                                        <p:cTn id="10" dur="700"/>
+                                        <p:tgtEl>
+                                          <p:spTgt spid="2"/>
+                                        </p:tgtEl>
+                                      </p:cBhvr>
+                                    </p:animEffect>
+                                  </p:childTnLst>
+                                </p:cTn>
+                              </p:par>
+                            </p:childTnLst>
+                          </p:cTn>
+                        </p:par>
+                      </p:childTnLst>
+                    </p:cTn>
+                  </p:par>
+                </p:childTnLst>
+              </p:cTn>
+              <p:prevCondLst>
+                <p:cond evt="onPrev" delay="0">
+                  <p:tgtEl>
+                    <p:sldTgt/>
+                  </p:tgtEl>
+                </p:cond>
+              </p:prevCondLst>
+              <p:nextCondLst>
+                <p:cond evt="onNext" delay="0">
+                  <p:tgtEl>
+                    <p:sldTgt/>
+                  </p:tgtEl>
+                </p:cond>
+              </p:nextCondLst>
+            </p:seq>
+          </p:childTnLst>
+        </p:cTn>
+      </p:par>
+    </p:tnLst>
+    <p:bldLst>
+      <p:bldP spid="2" grpId="0"/>
+    </p:bldLst>
+  </p:timing>
+</p:sld>
+</file>
+
+<file path=ppt/slides/slide13.xml><?xml version="1.0" encoding="utf-8"?>
+<p:sld xmlns:a="http://schemas.openxmlformats.org/drawingml/2006/main" xmlns:r="http://schemas.openxmlformats.org/officeDocument/2006/relationships" xmlns:p="http://schemas.openxmlformats.org/presentationml/2006/main">
+  <p:cSld>
+    <p:bg>
+      <p:bgPr>
+        <a:solidFill>
+          <a:schemeClr val="bg1"/>
+        </a:solidFill>
+        <a:effectLst/>
+      </p:bgPr>
+    </p:bg>
+    <p:spTree>
+      <p:nvGrpSpPr>
+        <p:cNvPr id="1" name=""/>
+        <p:cNvGrpSpPr/>
+        <p:nvPr/>
+      </p:nvGrpSpPr>
+      <p:grpSpPr>
+        <a:xfrm>
+          <a:off x="0" y="0"/>
+          <a:ext cx="0" cy="0"/>
+          <a:chOff x="0" y="0"/>
+          <a:chExt cx="0" cy="0"/>
+        </a:xfrm>
+      </p:grpSpPr>
+      <p:sp useBgFill="1">
+        <p:nvSpPr>
+          <p:cNvPr id="9" name="Rectangle 8">
+            <a:extLst>
+              <a:ext uri="{FF2B5EF4-FFF2-40B4-BE49-F238E27FC236}">
+                <a16:creationId xmlns:a16="http://schemas.microsoft.com/office/drawing/2014/main" id="{BACC6370-2D7E-4714-9D71-7542949D7D5D}"/>
+              </a:ext>
+              <a:ext uri="{C183D7F6-B498-43B3-948B-1728B52AA6E4}">
+                <adec:decorative xmlns:adec="http://schemas.microsoft.com/office/drawing/2017/decorative" val="1"/>
+              </a:ext>
+            </a:extLst>
+          </p:cNvPr>
+          <p:cNvSpPr>
+            <a:spLocks noGrp="1" noRot="1" noChangeAspect="1" noMove="1" noResize="1" noEditPoints="1" noAdjustHandles="1" noChangeArrowheads="1" noChangeShapeType="1" noTextEdit="1"/>
+          </p:cNvSpPr>
+          <p:nvPr>
+            <p:extLst>
+              <p:ext uri="{386F3935-93C4-4BCD-93E2-E3B085C9AB24}">
+                <p16:designElem xmlns:p16="http://schemas.microsoft.com/office/powerpoint/2015/main" val="1"/>
+              </p:ext>
+            </p:extLst>
+          </p:nvPr>
+        </p:nvSpPr>
+        <p:spPr>
+          <a:xfrm>
+            <a:off x="0" y="0"/>
+            <a:ext cx="12192000" cy="6858000"/>
+          </a:xfrm>
+          <a:prstGeom prst="rect">
+            <a:avLst/>
+          </a:prstGeom>
+          <a:ln w="12700" cap="flat" cmpd="sng" algn="ctr">
+            <a:noFill/>
+            <a:prstDash val="solid"/>
+            <a:miter lim="800000"/>
+          </a:ln>
+          <a:effectLst/>
+          <a:extLst>
+            <a:ext uri="{91240B29-F687-4F45-9708-019B960494DF}">
+              <a14:hiddenLine xmlns:a14="http://schemas.microsoft.com/office/drawing/2010/main" w="12700" cap="flat" cmpd="sng" algn="ctr">
+                <a:solidFill>
+                  <a:schemeClr val="accent1">
+                    <a:shade val="50000"/>
+                  </a:schemeClr>
+                </a:solidFill>
+                <a:prstDash val="solid"/>
+                <a:miter lim="800000"/>
+              </a14:hiddenLine>
+            </a:ext>
+          </a:extLst>
+        </p:spPr>
+        <p:style>
+          <a:lnRef idx="2">
+            <a:schemeClr val="accent1">
+              <a:shade val="50000"/>
+            </a:schemeClr>
+          </a:lnRef>
+          <a:fillRef idx="1">
+            <a:schemeClr val="accent1"/>
+          </a:fillRef>
+          <a:effectRef idx="0">
+            <a:schemeClr val="accent1"/>
+          </a:effectRef>
+          <a:fontRef idx="minor">
+            <a:schemeClr val="lt1"/>
+          </a:fontRef>
+        </p:style>
+        <p:txBody>
+          <a:bodyPr rtlCol="0" anchor="ctr"/>
+          <a:lstStyle/>
+          <a:p>
+            <a:pPr algn="ctr"/>
+            <a:endParaRPr lang="en-US"/>
+          </a:p>
+        </p:txBody>
+      </p:sp>
+      <p:sp>
+        <p:nvSpPr>
           <p:cNvPr id="11" name="Rectangle 10">
             <a:extLst>
               <a:ext uri="{FF2B5EF4-FFF2-40B4-BE49-F238E27FC236}">
@@ -13890,7 +14602,7 @@
 </p:sld>
 </file>
 
-<file path=ppt/slides/slide13.xml><?xml version="1.0" encoding="utf-8"?>
+<file path=ppt/slides/slide14.xml><?xml version="1.0" encoding="utf-8"?>
 <p:sld xmlns:a="http://schemas.openxmlformats.org/drawingml/2006/main" xmlns:r="http://schemas.openxmlformats.org/officeDocument/2006/relationships" xmlns:p="http://schemas.openxmlformats.org/presentationml/2006/main">
   <p:cSld>
     <p:bg>
@@ -14713,7 +15425,7 @@
 </p:sld>
 </file>
 
-<file path=ppt/slides/slide14.xml><?xml version="1.0" encoding="utf-8"?>
+<file path=ppt/slides/slide15.xml><?xml version="1.0" encoding="utf-8"?>
 <p:sld xmlns:a="http://schemas.openxmlformats.org/drawingml/2006/main" xmlns:r="http://schemas.openxmlformats.org/officeDocument/2006/relationships" xmlns:p="http://schemas.openxmlformats.org/presentationml/2006/main">
   <p:cSld>
     <p:bg>
@@ -15128,7 +15840,7 @@
 </p:sld>
 </file>
 
-<file path=ppt/slides/slide15.xml><?xml version="1.0" encoding="utf-8"?>
+<file path=ppt/slides/slide16.xml><?xml version="1.0" encoding="utf-8"?>
 <p:sld xmlns:a="http://schemas.openxmlformats.org/drawingml/2006/main" xmlns:r="http://schemas.openxmlformats.org/officeDocument/2006/relationships" xmlns:p="http://schemas.openxmlformats.org/presentationml/2006/main">
   <p:cSld>
     <p:bg>
@@ -15790,7 +16502,327 @@
 </p:sld>
 </file>
 
-<file path=ppt/slides/slide16.xml><?xml version="1.0" encoding="utf-8"?>
+<file path=ppt/slides/slide17.xml><?xml version="1.0" encoding="utf-8"?>
+<p:sld xmlns:a="http://schemas.openxmlformats.org/drawingml/2006/main" xmlns:r="http://schemas.openxmlformats.org/officeDocument/2006/relationships" xmlns:p="http://schemas.openxmlformats.org/presentationml/2006/main">
+  <p:cSld>
+    <p:bg>
+      <p:bgPr>
+        <a:solidFill>
+          <a:schemeClr val="bg1"/>
+        </a:solidFill>
+        <a:effectLst/>
+      </p:bgPr>
+    </p:bg>
+    <p:spTree>
+      <p:nvGrpSpPr>
+        <p:cNvPr id="1" name=""/>
+        <p:cNvGrpSpPr/>
+        <p:nvPr/>
+      </p:nvGrpSpPr>
+      <p:grpSpPr>
+        <a:xfrm>
+          <a:off x="0" y="0"/>
+          <a:ext cx="0" cy="0"/>
+          <a:chOff x="0" y="0"/>
+          <a:chExt cx="0" cy="0"/>
+        </a:xfrm>
+      </p:grpSpPr>
+      <p:sp useBgFill="1">
+        <p:nvSpPr>
+          <p:cNvPr id="11" name="Rectangle 10">
+            <a:extLst>
+              <a:ext uri="{FF2B5EF4-FFF2-40B4-BE49-F238E27FC236}">
+                <a16:creationId xmlns:a16="http://schemas.microsoft.com/office/drawing/2014/main" id="{3AFE8227-C443-417B-BA91-520EB1EF4559}"/>
+              </a:ext>
+              <a:ext uri="{C183D7F6-B498-43B3-948B-1728B52AA6E4}">
+                <adec:decorative xmlns:adec="http://schemas.microsoft.com/office/drawing/2017/decorative" val="1"/>
+              </a:ext>
+            </a:extLst>
+          </p:cNvPr>
+          <p:cNvSpPr>
+            <a:spLocks noGrp="1" noRot="1" noChangeAspect="1" noMove="1" noResize="1" noEditPoints="1" noAdjustHandles="1" noChangeArrowheads="1" noChangeShapeType="1" noTextEdit="1"/>
+          </p:cNvSpPr>
+          <p:nvPr>
+            <p:extLst>
+              <p:ext uri="{386F3935-93C4-4BCD-93E2-E3B085C9AB24}">
+                <p16:designElem xmlns:p16="http://schemas.microsoft.com/office/powerpoint/2015/main" val="1"/>
+              </p:ext>
+            </p:extLst>
+          </p:nvPr>
+        </p:nvSpPr>
+        <p:spPr>
+          <a:xfrm>
+            <a:off x="0" y="2"/>
+            <a:ext cx="12192000" cy="6857997"/>
+          </a:xfrm>
+          <a:prstGeom prst="rect">
+            <a:avLst/>
+          </a:prstGeom>
+          <a:ln>
+            <a:noFill/>
+          </a:ln>
+        </p:spPr>
+        <p:style>
+          <a:lnRef idx="2">
+            <a:schemeClr val="accent1">
+              <a:shade val="50000"/>
+            </a:schemeClr>
+          </a:lnRef>
+          <a:fillRef idx="1">
+            <a:schemeClr val="accent1"/>
+          </a:fillRef>
+          <a:effectRef idx="0">
+            <a:schemeClr val="accent1"/>
+          </a:effectRef>
+          <a:fontRef idx="minor">
+            <a:schemeClr val="lt1"/>
+          </a:fontRef>
+        </p:style>
+        <p:txBody>
+          <a:bodyPr rtlCol="0" anchor="ctr"/>
+          <a:lstStyle/>
+          <a:p>
+            <a:pPr algn="ctr"/>
+            <a:endParaRPr lang="en-US"/>
+          </a:p>
+        </p:txBody>
+      </p:sp>
+      <p:pic>
+        <p:nvPicPr>
+          <p:cNvPr id="5" name="Content Placeholder 4">
+            <a:extLst>
+              <a:ext uri="{FF2B5EF4-FFF2-40B4-BE49-F238E27FC236}">
+                <a16:creationId xmlns:a16="http://schemas.microsoft.com/office/drawing/2014/main" id="{CF0F927B-5FA6-E92D-27F6-640DFEAC5B4A}"/>
+              </a:ext>
+            </a:extLst>
+          </p:cNvPr>
+          <p:cNvPicPr>
+            <a:picLocks noGrp="1" noChangeAspect="1"/>
+          </p:cNvPicPr>
+          <p:nvPr>
+            <p:ph idx="1"/>
+          </p:nvPr>
+        </p:nvPicPr>
+        <p:blipFill rotWithShape="1">
+          <a:blip r:embed="rId2"/>
+          <a:srcRect t="3406" r="-1" b="-1"/>
+          <a:stretch/>
+        </p:blipFill>
+        <p:spPr>
+          <a:xfrm>
+            <a:off x="20" y="431"/>
+            <a:ext cx="8115280" cy="6408311"/>
+          </a:xfrm>
+          <a:prstGeom prst="rect">
+            <a:avLst/>
+          </a:prstGeom>
+        </p:spPr>
+      </p:pic>
+      <p:sp>
+        <p:nvSpPr>
+          <p:cNvPr id="6" name="TextBox 5">
+            <a:extLst>
+              <a:ext uri="{FF2B5EF4-FFF2-40B4-BE49-F238E27FC236}">
+                <a16:creationId xmlns:a16="http://schemas.microsoft.com/office/drawing/2014/main" id="{58428015-CF0A-8E60-CE2F-B633028AA458}"/>
+              </a:ext>
+            </a:extLst>
+          </p:cNvPr>
+          <p:cNvSpPr txBox="1"/>
+          <p:nvPr/>
+        </p:nvSpPr>
+        <p:spPr>
+          <a:xfrm>
+            <a:off x="8643193" y="5501471"/>
+            <a:ext cx="2942813" cy="457202"/>
+          </a:xfrm>
+          <a:prstGeom prst="rect">
+            <a:avLst/>
+          </a:prstGeom>
+        </p:spPr>
+        <p:txBody>
+          <a:bodyPr vert="horz" lIns="91440" tIns="45720" rIns="91440" bIns="45720" rtlCol="0">
+            <a:normAutofit/>
+          </a:bodyPr>
+          <a:lstStyle/>
+          <a:p>
+            <a:pPr>
+              <a:lnSpc>
+                <a:spcPct val="90000"/>
+              </a:lnSpc>
+              <a:spcAft>
+                <a:spcPts val="600"/>
+              </a:spcAft>
+            </a:pPr>
+            <a:r>
+              <a:rPr lang="en-US" sz="2000" b="1" dirty="0"/>
+              <a:t>(Caulfield, 2020) </a:t>
+            </a:r>
+          </a:p>
+        </p:txBody>
+      </p:sp>
+      <p:sp>
+        <p:nvSpPr>
+          <p:cNvPr id="13" name="Rectangle 12">
+            <a:extLst>
+              <a:ext uri="{FF2B5EF4-FFF2-40B4-BE49-F238E27FC236}">
+                <a16:creationId xmlns:a16="http://schemas.microsoft.com/office/drawing/2014/main" id="{907741FC-B544-4A6E-B831-6789D042333D}"/>
+              </a:ext>
+              <a:ext uri="{C183D7F6-B498-43B3-948B-1728B52AA6E4}">
+                <adec:decorative xmlns:adec="http://schemas.microsoft.com/office/drawing/2017/decorative" val="1"/>
+              </a:ext>
+            </a:extLst>
+          </p:cNvPr>
+          <p:cNvSpPr>
+            <a:spLocks noGrp="1" noRot="1" noChangeAspect="1" noMove="1" noResize="1" noEditPoints="1" noAdjustHandles="1" noChangeArrowheads="1" noChangeShapeType="1" noTextEdit="1"/>
+          </p:cNvSpPr>
+          <p:nvPr>
+            <p:extLst>
+              <p:ext uri="{386F3935-93C4-4BCD-93E2-E3B085C9AB24}">
+                <p16:designElem xmlns:p16="http://schemas.microsoft.com/office/powerpoint/2015/main" val="1"/>
+              </p:ext>
+            </p:extLst>
+          </p:nvPr>
+        </p:nvSpPr>
+        <p:spPr>
+          <a:xfrm flipH="1">
+            <a:off x="-1" y="6408741"/>
+            <a:ext cx="12191998" cy="457202"/>
+          </a:xfrm>
+          <a:prstGeom prst="rect">
+            <a:avLst/>
+          </a:prstGeom>
+          <a:gradFill>
+            <a:gsLst>
+              <a:gs pos="34000">
+                <a:srgbClr val="000000">
+                  <a:alpha val="96000"/>
+                </a:srgbClr>
+              </a:gs>
+              <a:gs pos="100000">
+                <a:schemeClr val="accent1"/>
+              </a:gs>
+            </a:gsLst>
+            <a:lin ang="8400000" scaled="0"/>
+          </a:gradFill>
+          <a:ln>
+            <a:noFill/>
+          </a:ln>
+        </p:spPr>
+        <p:style>
+          <a:lnRef idx="2">
+            <a:schemeClr val="accent1">
+              <a:shade val="50000"/>
+            </a:schemeClr>
+          </a:lnRef>
+          <a:fillRef idx="1">
+            <a:schemeClr val="accent1"/>
+          </a:fillRef>
+          <a:effectRef idx="0">
+            <a:schemeClr val="accent1"/>
+          </a:effectRef>
+          <a:fontRef idx="minor">
+            <a:schemeClr val="lt1"/>
+          </a:fontRef>
+        </p:style>
+        <p:txBody>
+          <a:bodyPr rtlCol="0" anchor="ctr"/>
+          <a:lstStyle/>
+          <a:p>
+            <a:pPr algn="ctr"/>
+            <a:endParaRPr lang="en-US"/>
+          </a:p>
+        </p:txBody>
+      </p:sp>
+      <p:sp>
+        <p:nvSpPr>
+          <p:cNvPr id="15" name="Rectangle 14">
+            <a:extLst>
+              <a:ext uri="{FF2B5EF4-FFF2-40B4-BE49-F238E27FC236}">
+                <a16:creationId xmlns:a16="http://schemas.microsoft.com/office/drawing/2014/main" id="{3F0BE7ED-7814-4273-B18A-F26CC0380380}"/>
+              </a:ext>
+              <a:ext uri="{C183D7F6-B498-43B3-948B-1728B52AA6E4}">
+                <adec:decorative xmlns:adec="http://schemas.microsoft.com/office/drawing/2017/decorative" val="1"/>
+              </a:ext>
+            </a:extLst>
+          </p:cNvPr>
+          <p:cNvSpPr>
+            <a:spLocks noGrp="1" noRot="1" noChangeAspect="1" noMove="1" noResize="1" noEditPoints="1" noAdjustHandles="1" noChangeArrowheads="1" noChangeShapeType="1" noTextEdit="1"/>
+          </p:cNvSpPr>
+          <p:nvPr>
+            <p:extLst>
+              <p:ext uri="{386F3935-93C4-4BCD-93E2-E3B085C9AB24}">
+                <p16:designElem xmlns:p16="http://schemas.microsoft.com/office/powerpoint/2015/main" val="1"/>
+              </p:ext>
+            </p:extLst>
+          </p:nvPr>
+        </p:nvSpPr>
+        <p:spPr>
+          <a:xfrm flipH="1">
+            <a:off x="-4" y="6408742"/>
+            <a:ext cx="8115300" cy="449258"/>
+          </a:xfrm>
+          <a:prstGeom prst="rect">
+            <a:avLst/>
+          </a:prstGeom>
+          <a:gradFill>
+            <a:gsLst>
+              <a:gs pos="28000">
+                <a:schemeClr val="accent1">
+                  <a:lumMod val="75000"/>
+                  <a:alpha val="59000"/>
+                </a:schemeClr>
+              </a:gs>
+              <a:gs pos="100000">
+                <a:srgbClr val="000000">
+                  <a:alpha val="70000"/>
+                </a:srgbClr>
+              </a:gs>
+            </a:gsLst>
+            <a:lin ang="11400000" scaled="0"/>
+          </a:gradFill>
+          <a:ln>
+            <a:noFill/>
+          </a:ln>
+        </p:spPr>
+        <p:style>
+          <a:lnRef idx="2">
+            <a:schemeClr val="accent1">
+              <a:shade val="50000"/>
+            </a:schemeClr>
+          </a:lnRef>
+          <a:fillRef idx="1">
+            <a:schemeClr val="accent1"/>
+          </a:fillRef>
+          <a:effectRef idx="0">
+            <a:schemeClr val="accent1"/>
+          </a:effectRef>
+          <a:fontRef idx="minor">
+            <a:schemeClr val="lt1"/>
+          </a:fontRef>
+        </p:style>
+        <p:txBody>
+          <a:bodyPr rtlCol="0" anchor="ctr"/>
+          <a:lstStyle/>
+          <a:p>
+            <a:pPr algn="ctr"/>
+            <a:endParaRPr lang="en-US"/>
+          </a:p>
+        </p:txBody>
+      </p:sp>
+    </p:spTree>
+    <p:extLst>
+      <p:ext uri="{BB962C8B-B14F-4D97-AF65-F5344CB8AC3E}">
+        <p14:creationId xmlns:p14="http://schemas.microsoft.com/office/powerpoint/2010/main" val="4178298851"/>
+      </p:ext>
+    </p:extLst>
+  </p:cSld>
+  <p:clrMapOvr>
+    <a:masterClrMapping/>
+  </p:clrMapOvr>
+</p:sld>
+</file>
+
+<file path=ppt/slides/slide18.xml><?xml version="1.0" encoding="utf-8"?>
 <p:sld xmlns:a="http://schemas.openxmlformats.org/drawingml/2006/main" xmlns:r="http://schemas.openxmlformats.org/officeDocument/2006/relationships" xmlns:p="http://schemas.openxmlformats.org/presentationml/2006/main">
   <p:cSld>
     <p:bg>
@@ -16452,7 +17484,599 @@
 </p:sld>
 </file>
 
-<file path=ppt/slides/slide17.xml><?xml version="1.0" encoding="utf-8"?>
+<file path=ppt/slides/slide19.xml><?xml version="1.0" encoding="utf-8"?>
+<p:sld xmlns:a="http://schemas.openxmlformats.org/drawingml/2006/main" xmlns:r="http://schemas.openxmlformats.org/officeDocument/2006/relationships" xmlns:p="http://schemas.openxmlformats.org/presentationml/2006/main">
+  <p:cSld>
+    <p:bg>
+      <p:bgPr>
+        <a:solidFill>
+          <a:schemeClr val="bg1"/>
+        </a:solidFill>
+        <a:effectLst/>
+      </p:bgPr>
+    </p:bg>
+    <p:spTree>
+      <p:nvGrpSpPr>
+        <p:cNvPr id="1" name=""/>
+        <p:cNvGrpSpPr/>
+        <p:nvPr/>
+      </p:nvGrpSpPr>
+      <p:grpSpPr>
+        <a:xfrm>
+          <a:off x="0" y="0"/>
+          <a:ext cx="0" cy="0"/>
+          <a:chOff x="0" y="0"/>
+          <a:chExt cx="0" cy="0"/>
+        </a:xfrm>
+      </p:grpSpPr>
+      <p:sp useBgFill="1">
+        <p:nvSpPr>
+          <p:cNvPr id="30" name="Rectangle 29">
+            <a:extLst>
+              <a:ext uri="{FF2B5EF4-FFF2-40B4-BE49-F238E27FC236}">
+                <a16:creationId xmlns:a16="http://schemas.microsoft.com/office/drawing/2014/main" id="{2596F992-698C-48C0-9D89-70DA4CE927EF}"/>
+              </a:ext>
+              <a:ext uri="{C183D7F6-B498-43B3-948B-1728B52AA6E4}">
+                <adec:decorative xmlns:adec="http://schemas.microsoft.com/office/drawing/2017/decorative" val="1"/>
+              </a:ext>
+            </a:extLst>
+          </p:cNvPr>
+          <p:cNvSpPr>
+            <a:spLocks noGrp="1" noRot="1" noChangeAspect="1" noMove="1" noResize="1" noEditPoints="1" noAdjustHandles="1" noChangeArrowheads="1" noChangeShapeType="1" noTextEdit="1"/>
+          </p:cNvSpPr>
+          <p:nvPr>
+            <p:extLst>
+              <p:ext uri="{386F3935-93C4-4BCD-93E2-E3B085C9AB24}">
+                <p16:designElem xmlns:p16="http://schemas.microsoft.com/office/powerpoint/2015/main" val="1"/>
+              </p:ext>
+            </p:extLst>
+          </p:nvPr>
+        </p:nvSpPr>
+        <p:spPr>
+          <a:xfrm>
+            <a:off x="0" y="0"/>
+            <a:ext cx="12192000" cy="6858000"/>
+          </a:xfrm>
+          <a:prstGeom prst="rect">
+            <a:avLst/>
+          </a:prstGeom>
+          <a:ln w="12700" cap="flat" cmpd="sng" algn="ctr">
+            <a:noFill/>
+            <a:prstDash val="solid"/>
+            <a:miter lim="800000"/>
+          </a:ln>
+          <a:effectLst/>
+          <a:extLst>
+            <a:ext uri="{91240B29-F687-4F45-9708-019B960494DF}">
+              <a14:hiddenLine xmlns:a14="http://schemas.microsoft.com/office/drawing/2010/main" w="12700" cap="flat" cmpd="sng" algn="ctr">
+                <a:solidFill>
+                  <a:schemeClr val="accent1">
+                    <a:shade val="50000"/>
+                  </a:schemeClr>
+                </a:solidFill>
+                <a:prstDash val="solid"/>
+                <a:miter lim="800000"/>
+              </a14:hiddenLine>
+            </a:ext>
+          </a:extLst>
+        </p:spPr>
+        <p:style>
+          <a:lnRef idx="2">
+            <a:schemeClr val="accent1">
+              <a:shade val="50000"/>
+            </a:schemeClr>
+          </a:lnRef>
+          <a:fillRef idx="1">
+            <a:schemeClr val="accent1"/>
+          </a:fillRef>
+          <a:effectRef idx="0">
+            <a:schemeClr val="accent1"/>
+          </a:effectRef>
+          <a:fontRef idx="minor">
+            <a:schemeClr val="lt1"/>
+          </a:fontRef>
+        </p:style>
+        <p:txBody>
+          <a:bodyPr rtlCol="0" anchor="ctr"/>
+          <a:lstStyle/>
+          <a:p>
+            <a:pPr algn="ctr"/>
+            <a:endParaRPr lang="en-US"/>
+          </a:p>
+        </p:txBody>
+      </p:sp>
+      <p:pic>
+        <p:nvPicPr>
+          <p:cNvPr id="5" name="Content Placeholder 4">
+            <a:extLst>
+              <a:ext uri="{FF2B5EF4-FFF2-40B4-BE49-F238E27FC236}">
+                <a16:creationId xmlns:a16="http://schemas.microsoft.com/office/drawing/2014/main" id="{A79E1CB6-E62C-F211-5E26-29C6D938EC9E}"/>
+              </a:ext>
+            </a:extLst>
+          </p:cNvPr>
+          <p:cNvPicPr>
+            <a:picLocks noChangeAspect="1"/>
+          </p:cNvPicPr>
+          <p:nvPr/>
+        </p:nvPicPr>
+        <p:blipFill>
+          <a:blip r:embed="rId2"/>
+          <a:stretch>
+            <a:fillRect/>
+          </a:stretch>
+        </p:blipFill>
+        <p:spPr>
+          <a:xfrm>
+            <a:off x="526110" y="1713113"/>
+            <a:ext cx="11139778" cy="2979889"/>
+          </a:xfrm>
+          <a:prstGeom prst="rect">
+            <a:avLst/>
+          </a:prstGeom>
+        </p:spPr>
+      </p:pic>
+      <p:sp>
+        <p:nvSpPr>
+          <p:cNvPr id="32" name="Rectangle 31">
+            <a:extLst>
+              <a:ext uri="{FF2B5EF4-FFF2-40B4-BE49-F238E27FC236}">
+                <a16:creationId xmlns:a16="http://schemas.microsoft.com/office/drawing/2014/main" id="{E7BFF8DC-0AE7-4AD2-9B28-2E5F26D62C30}"/>
+              </a:ext>
+              <a:ext uri="{C183D7F6-B498-43B3-948B-1728B52AA6E4}">
+                <adec:decorative xmlns:adec="http://schemas.microsoft.com/office/drawing/2017/decorative" val="1"/>
+              </a:ext>
+            </a:extLst>
+          </p:cNvPr>
+          <p:cNvSpPr>
+            <a:spLocks noGrp="1" noRot="1" noChangeAspect="1" noMove="1" noResize="1" noEditPoints="1" noAdjustHandles="1" noChangeArrowheads="1" noChangeShapeType="1" noTextEdit="1"/>
+          </p:cNvSpPr>
+          <p:nvPr>
+            <p:extLst>
+              <p:ext uri="{386F3935-93C4-4BCD-93E2-E3B085C9AB24}">
+                <p16:designElem xmlns:p16="http://schemas.microsoft.com/office/powerpoint/2015/main" val="1"/>
+              </p:ext>
+            </p:extLst>
+          </p:nvPr>
+        </p:nvSpPr>
+        <p:spPr>
+          <a:xfrm flipH="1">
+            <a:off x="0" y="6406116"/>
+            <a:ext cx="12191998" cy="461774"/>
+          </a:xfrm>
+          <a:prstGeom prst="rect">
+            <a:avLst/>
+          </a:prstGeom>
+          <a:gradFill>
+            <a:gsLst>
+              <a:gs pos="0">
+                <a:srgbClr val="000000"/>
+              </a:gs>
+              <a:gs pos="100000">
+                <a:schemeClr val="accent1">
+                  <a:lumMod val="75000"/>
+                </a:schemeClr>
+              </a:gs>
+            </a:gsLst>
+            <a:lin ang="15000000" scaled="0"/>
+          </a:gradFill>
+          <a:ln>
+            <a:noFill/>
+          </a:ln>
+        </p:spPr>
+        <p:style>
+          <a:lnRef idx="2">
+            <a:schemeClr val="accent1">
+              <a:shade val="50000"/>
+            </a:schemeClr>
+          </a:lnRef>
+          <a:fillRef idx="1">
+            <a:schemeClr val="accent1"/>
+          </a:fillRef>
+          <a:effectRef idx="0">
+            <a:schemeClr val="accent1"/>
+          </a:effectRef>
+          <a:fontRef idx="minor">
+            <a:schemeClr val="lt1"/>
+          </a:fontRef>
+        </p:style>
+        <p:txBody>
+          <a:bodyPr rtlCol="0" anchor="ctr"/>
+          <a:lstStyle/>
+          <a:p>
+            <a:pPr algn="ctr"/>
+            <a:endParaRPr lang="en-US"/>
+          </a:p>
+        </p:txBody>
+      </p:sp>
+      <p:sp>
+        <p:nvSpPr>
+          <p:cNvPr id="34" name="Rectangle 33">
+            <a:extLst>
+              <a:ext uri="{FF2B5EF4-FFF2-40B4-BE49-F238E27FC236}">
+                <a16:creationId xmlns:a16="http://schemas.microsoft.com/office/drawing/2014/main" id="{7E0162AD-C6E5-4BF8-A453-76ADB36877D3}"/>
+              </a:ext>
+              <a:ext uri="{C183D7F6-B498-43B3-948B-1728B52AA6E4}">
+                <adec:decorative xmlns:adec="http://schemas.microsoft.com/office/drawing/2017/decorative" val="1"/>
+              </a:ext>
+            </a:extLst>
+          </p:cNvPr>
+          <p:cNvSpPr>
+            <a:spLocks noGrp="1" noRot="1" noChangeAspect="1" noMove="1" noResize="1" noEditPoints="1" noAdjustHandles="1" noChangeArrowheads="1" noChangeShapeType="1" noTextEdit="1"/>
+          </p:cNvSpPr>
+          <p:nvPr>
+            <p:extLst>
+              <p:ext uri="{386F3935-93C4-4BCD-93E2-E3B085C9AB24}">
+                <p16:designElem xmlns:p16="http://schemas.microsoft.com/office/powerpoint/2015/main" val="1"/>
+              </p:ext>
+            </p:extLst>
+          </p:nvPr>
+        </p:nvSpPr>
+        <p:spPr>
+          <a:xfrm flipH="1">
+            <a:off x="8115300" y="6406115"/>
+            <a:ext cx="4076698" cy="464399"/>
+          </a:xfrm>
+          <a:prstGeom prst="rect">
+            <a:avLst/>
+          </a:prstGeom>
+          <a:gradFill>
+            <a:gsLst>
+              <a:gs pos="19000">
+                <a:srgbClr val="000000">
+                  <a:alpha val="31000"/>
+                </a:srgbClr>
+              </a:gs>
+              <a:gs pos="99000">
+                <a:schemeClr val="accent1"/>
+              </a:gs>
+            </a:gsLst>
+            <a:lin ang="13200000" scaled="0"/>
+          </a:gradFill>
+          <a:ln>
+            <a:noFill/>
+          </a:ln>
+        </p:spPr>
+        <p:style>
+          <a:lnRef idx="2">
+            <a:schemeClr val="accent1">
+              <a:shade val="50000"/>
+            </a:schemeClr>
+          </a:lnRef>
+          <a:fillRef idx="1">
+            <a:schemeClr val="accent1"/>
+          </a:fillRef>
+          <a:effectRef idx="0">
+            <a:schemeClr val="accent1"/>
+          </a:effectRef>
+          <a:fontRef idx="minor">
+            <a:schemeClr val="lt1"/>
+          </a:fontRef>
+        </p:style>
+        <p:txBody>
+          <a:bodyPr rtlCol="0" anchor="ctr"/>
+          <a:lstStyle/>
+          <a:p>
+            <a:pPr algn="ctr"/>
+            <a:endParaRPr lang="en-US"/>
+          </a:p>
+        </p:txBody>
+      </p:sp>
+      <p:sp>
+        <p:nvSpPr>
+          <p:cNvPr id="6" name="TextBox 5">
+            <a:extLst>
+              <a:ext uri="{FF2B5EF4-FFF2-40B4-BE49-F238E27FC236}">
+                <a16:creationId xmlns:a16="http://schemas.microsoft.com/office/drawing/2014/main" id="{4E87431A-B871-9243-85CE-8F6BE36554A9}"/>
+              </a:ext>
+            </a:extLst>
+          </p:cNvPr>
+          <p:cNvSpPr txBox="1"/>
+          <p:nvPr/>
+        </p:nvSpPr>
+        <p:spPr>
+          <a:xfrm>
+            <a:off x="9519138" y="5838092"/>
+            <a:ext cx="2146750" cy="369332"/>
+          </a:xfrm>
+          <a:prstGeom prst="rect">
+            <a:avLst/>
+          </a:prstGeom>
+          <a:noFill/>
+        </p:spPr>
+        <p:txBody>
+          <a:bodyPr wrap="square" rtlCol="0">
+            <a:spAutoFit/>
+          </a:bodyPr>
+          <a:lstStyle/>
+          <a:p>
+            <a:r>
+              <a:rPr lang="en-US" b="1" dirty="0"/>
+              <a:t>(Flores, 2023)</a:t>
+            </a:r>
+            <a:endParaRPr lang="en-NZ" b="1" dirty="0"/>
+          </a:p>
+        </p:txBody>
+      </p:sp>
+    </p:spTree>
+    <p:extLst>
+      <p:ext uri="{BB962C8B-B14F-4D97-AF65-F5344CB8AC3E}">
+        <p14:creationId xmlns:p14="http://schemas.microsoft.com/office/powerpoint/2010/main" val="451352539"/>
+      </p:ext>
+    </p:extLst>
+  </p:cSld>
+  <p:clrMapOvr>
+    <a:masterClrMapping/>
+  </p:clrMapOvr>
+</p:sld>
+</file>
+
+<file path=ppt/slides/slide2.xml><?xml version="1.0" encoding="utf-8"?>
+<p:sld xmlns:a="http://schemas.openxmlformats.org/drawingml/2006/main" xmlns:r="http://schemas.openxmlformats.org/officeDocument/2006/relationships" xmlns:p="http://schemas.openxmlformats.org/presentationml/2006/main">
+  <p:cSld>
+    <p:bg>
+      <p:bgPr>
+        <a:solidFill>
+          <a:schemeClr val="bg1"/>
+        </a:solidFill>
+        <a:effectLst/>
+      </p:bgPr>
+    </p:bg>
+    <p:spTree>
+      <p:nvGrpSpPr>
+        <p:cNvPr id="1" name=""/>
+        <p:cNvGrpSpPr/>
+        <p:nvPr/>
+      </p:nvGrpSpPr>
+      <p:grpSpPr>
+        <a:xfrm>
+          <a:off x="0" y="0"/>
+          <a:ext cx="0" cy="0"/>
+          <a:chOff x="0" y="0"/>
+          <a:chExt cx="0" cy="0"/>
+        </a:xfrm>
+      </p:grpSpPr>
+      <p:sp>
+        <p:nvSpPr>
+          <p:cNvPr id="55" name="Rectangle 54">
+            <a:extLst>
+              <a:ext uri="{FF2B5EF4-FFF2-40B4-BE49-F238E27FC236}">
+                <a16:creationId xmlns:a16="http://schemas.microsoft.com/office/drawing/2014/main" id="{C5E6CFF1-2F42-4E10-9A97-F116F46F53FE}"/>
+              </a:ext>
+              <a:ext uri="{C183D7F6-B498-43B3-948B-1728B52AA6E4}">
+                <adec:decorative xmlns:adec="http://schemas.microsoft.com/office/drawing/2017/decorative" val="1"/>
+              </a:ext>
+            </a:extLst>
+          </p:cNvPr>
+          <p:cNvSpPr>
+            <a:spLocks noGrp="1" noRot="1" noChangeAspect="1" noMove="1" noResize="1" noEditPoints="1" noAdjustHandles="1" noChangeArrowheads="1" noChangeShapeType="1" noTextEdit="1"/>
+          </p:cNvSpPr>
+          <p:nvPr>
+            <p:extLst>
+              <p:ext uri="{386F3935-93C4-4BCD-93E2-E3B085C9AB24}">
+                <p16:designElem xmlns:p16="http://schemas.microsoft.com/office/powerpoint/2015/main" val="1"/>
+              </p:ext>
+            </p:extLst>
+          </p:nvPr>
+        </p:nvSpPr>
+        <p:spPr>
+          <a:xfrm>
+            <a:off x="0" y="0"/>
+            <a:ext cx="12192000" cy="6858000"/>
+          </a:xfrm>
+          <a:prstGeom prst="rect">
+            <a:avLst/>
+          </a:prstGeom>
+          <a:solidFill>
+            <a:srgbClr val="000000"/>
+          </a:solidFill>
+          <a:ln>
+            <a:noFill/>
+          </a:ln>
+        </p:spPr>
+        <p:style>
+          <a:lnRef idx="2">
+            <a:schemeClr val="accent1">
+              <a:shade val="50000"/>
+            </a:schemeClr>
+          </a:lnRef>
+          <a:fillRef idx="1">
+            <a:schemeClr val="accent1"/>
+          </a:fillRef>
+          <a:effectRef idx="0">
+            <a:schemeClr val="accent1"/>
+          </a:effectRef>
+          <a:fontRef idx="minor">
+            <a:schemeClr val="lt1"/>
+          </a:fontRef>
+        </p:style>
+        <p:txBody>
+          <a:bodyPr rtlCol="0" anchor="ctr"/>
+          <a:lstStyle/>
+          <a:p>
+            <a:pPr algn="ctr"/>
+            <a:endParaRPr lang="en-US"/>
+          </a:p>
+        </p:txBody>
+      </p:sp>
+      <p:pic>
+        <p:nvPicPr>
+          <p:cNvPr id="12" name="Picture 4" descr="Glasses on top of a book">
+            <a:extLst>
+              <a:ext uri="{FF2B5EF4-FFF2-40B4-BE49-F238E27FC236}">
+                <a16:creationId xmlns:a16="http://schemas.microsoft.com/office/drawing/2014/main" id="{7AA70AC1-119E-D28F-0547-20193109F92C}"/>
+              </a:ext>
+            </a:extLst>
+          </p:cNvPr>
+          <p:cNvPicPr>
+            <a:picLocks noChangeAspect="1"/>
+          </p:cNvPicPr>
+          <p:nvPr/>
+        </p:nvPicPr>
+        <p:blipFill rotWithShape="1">
+          <a:blip r:embed="rId2">
+            <a:alphaModFix amt="35000"/>
+          </a:blip>
+          <a:srcRect t="13324" b="1770"/>
+          <a:stretch/>
+        </p:blipFill>
+        <p:spPr>
+          <a:xfrm>
+            <a:off x="20" y="1"/>
+            <a:ext cx="12191980" cy="6857999"/>
+          </a:xfrm>
+          <a:prstGeom prst="rect">
+            <a:avLst/>
+          </a:prstGeom>
+        </p:spPr>
+      </p:pic>
+      <p:sp>
+        <p:nvSpPr>
+          <p:cNvPr id="2" name="Title 1">
+            <a:extLst>
+              <a:ext uri="{FF2B5EF4-FFF2-40B4-BE49-F238E27FC236}">
+                <a16:creationId xmlns:a16="http://schemas.microsoft.com/office/drawing/2014/main" id="{316297CF-43EE-01CB-C9FD-9EDD789F5735}"/>
+              </a:ext>
+            </a:extLst>
+          </p:cNvPr>
+          <p:cNvSpPr>
+            <a:spLocks noGrp="1"/>
+          </p:cNvSpPr>
+          <p:nvPr>
+            <p:ph type="title"/>
+          </p:nvPr>
+        </p:nvSpPr>
+        <p:spPr>
+          <a:xfrm>
+            <a:off x="838199" y="1065862"/>
+            <a:ext cx="6052955" cy="4726276"/>
+          </a:xfrm>
+        </p:spPr>
+        <p:txBody>
+          <a:bodyPr>
+            <a:normAutofit/>
+          </a:bodyPr>
+          <a:lstStyle/>
+          <a:p>
+            <a:pPr algn="r"/>
+            <a:r>
+              <a:rPr lang="en-US" sz="8000" dirty="0">
+                <a:ln w="22225">
+                  <a:solidFill>
+                    <a:srgbClr val="FFFFFF"/>
+                  </a:solidFill>
+                </a:ln>
+                <a:noFill/>
+              </a:rPr>
+              <a:t>Tell me</a:t>
+            </a:r>
+            <a:endParaRPr lang="en-NZ" sz="8000" dirty="0">
+              <a:ln w="22225">
+                <a:solidFill>
+                  <a:srgbClr val="FFFFFF"/>
+                </a:solidFill>
+              </a:ln>
+              <a:noFill/>
+            </a:endParaRPr>
+          </a:p>
+        </p:txBody>
+      </p:sp>
+      <p:cxnSp>
+        <p:nvCxnSpPr>
+          <p:cNvPr id="57" name="Straight Connector 56">
+            <a:extLst>
+              <a:ext uri="{FF2B5EF4-FFF2-40B4-BE49-F238E27FC236}">
+                <a16:creationId xmlns:a16="http://schemas.microsoft.com/office/drawing/2014/main" id="{96A8629B-8289-498B-939B-1CA0C106182C}"/>
+              </a:ext>
+              <a:ext uri="{C183D7F6-B498-43B3-948B-1728B52AA6E4}">
+                <adec:decorative xmlns:adec="http://schemas.microsoft.com/office/drawing/2017/decorative" val="1"/>
+              </a:ext>
+            </a:extLst>
+          </p:cNvPr>
+          <p:cNvCxnSpPr>
+            <a:cxnSpLocks noGrp="1" noRot="1" noChangeAspect="1" noMove="1" noResize="1" noEditPoints="1" noAdjustHandles="1" noChangeArrowheads="1" noChangeShapeType="1"/>
+          </p:cNvCxnSpPr>
+          <p:nvPr>
+            <p:extLst>
+              <p:ext uri="{386F3935-93C4-4BCD-93E2-E3B085C9AB24}">
+                <p16:designElem xmlns:p16="http://schemas.microsoft.com/office/powerpoint/2015/main" val="1"/>
+              </p:ext>
+            </p:extLst>
+          </p:nvPr>
+        </p:nvCxnSpPr>
+        <p:spPr>
+          <a:xfrm>
+            <a:off x="7212899" y="2286000"/>
+            <a:ext cx="0" cy="2286000"/>
+          </a:xfrm>
+          <a:prstGeom prst="line">
+            <a:avLst/>
+          </a:prstGeom>
+          <a:ln w="15875">
+            <a:solidFill>
+              <a:srgbClr val="FFFFFF"/>
+            </a:solidFill>
+          </a:ln>
+        </p:spPr>
+        <p:style>
+          <a:lnRef idx="1">
+            <a:schemeClr val="accent1"/>
+          </a:lnRef>
+          <a:fillRef idx="0">
+            <a:schemeClr val="accent1"/>
+          </a:fillRef>
+          <a:effectRef idx="0">
+            <a:schemeClr val="accent1"/>
+          </a:effectRef>
+          <a:fontRef idx="minor">
+            <a:schemeClr val="tx1"/>
+          </a:fontRef>
+        </p:style>
+      </p:cxnSp>
+      <p:graphicFrame>
+        <p:nvGraphicFramePr>
+          <p:cNvPr id="35" name="Content Placeholder 2">
+            <a:extLst>
+              <a:ext uri="{FF2B5EF4-FFF2-40B4-BE49-F238E27FC236}">
+                <a16:creationId xmlns:a16="http://schemas.microsoft.com/office/drawing/2014/main" id="{9380F06F-3A1E-08A3-74C8-E66A6A643448}"/>
+              </a:ext>
+            </a:extLst>
+          </p:cNvPr>
+          <p:cNvGraphicFramePr>
+            <a:graphicFrameLocks noGrp="1"/>
+          </p:cNvGraphicFramePr>
+          <p:nvPr>
+            <p:ph idx="1"/>
+            <p:extLst>
+              <p:ext uri="{D42A27DB-BD31-4B8C-83A1-F6EECF244321}">
+                <p14:modId xmlns:p14="http://schemas.microsoft.com/office/powerpoint/2010/main" val="2045123527"/>
+              </p:ext>
+            </p:extLst>
+          </p:nvPr>
+        </p:nvGraphicFramePr>
+        <p:xfrm>
+          <a:off x="7534641" y="1065862"/>
+          <a:ext cx="3860002" cy="4726276"/>
+        </p:xfrm>
+        <a:graphic>
+          <a:graphicData uri="http://schemas.openxmlformats.org/drawingml/2006/diagram">
+            <dgm:relIds xmlns:dgm="http://schemas.openxmlformats.org/drawingml/2006/diagram" xmlns:r="http://schemas.openxmlformats.org/officeDocument/2006/relationships" r:dm="rId3" r:lo="rId4" r:qs="rId5" r:cs="rId6"/>
+          </a:graphicData>
+        </a:graphic>
+      </p:graphicFrame>
+    </p:spTree>
+    <p:extLst>
+      <p:ext uri="{BB962C8B-B14F-4D97-AF65-F5344CB8AC3E}">
+        <p14:creationId xmlns:p14="http://schemas.microsoft.com/office/powerpoint/2010/main" val="1294787981"/>
+      </p:ext>
+    </p:extLst>
+  </p:cSld>
+  <p:clrMapOvr>
+    <a:overrideClrMapping bg1="dk1" tx1="lt1" bg2="dk2" tx2="lt2" accent1="accent1" accent2="accent2" accent3="accent3" accent4="accent4" accent5="accent5" accent6="accent6" hlink="hlink" folHlink="folHlink"/>
+  </p:clrMapOvr>
+</p:sld>
+</file>
+
+<file path=ppt/slides/slide20.xml><?xml version="1.0" encoding="utf-8"?>
 <p:sld xmlns:a="http://schemas.openxmlformats.org/drawingml/2006/main" xmlns:r="http://schemas.openxmlformats.org/officeDocument/2006/relationships" xmlns:p="http://schemas.openxmlformats.org/presentationml/2006/main">
   <p:cSld>
     <p:bg>
@@ -17118,7 +18742,7 @@
 </p:sld>
 </file>
 
-<file path=ppt/slides/slide18.xml><?xml version="1.0" encoding="utf-8"?>
+<file path=ppt/slides/slide21.xml><?xml version="1.0" encoding="utf-8"?>
 <p:sld xmlns:a="http://schemas.openxmlformats.org/drawingml/2006/main" xmlns:r="http://schemas.openxmlformats.org/officeDocument/2006/relationships" xmlns:p="http://schemas.openxmlformats.org/presentationml/2006/main">
   <p:cSld>
     <p:bg>
@@ -17694,7 +19318,7 @@
 </p:sld>
 </file>
 
-<file path=ppt/slides/slide19.xml><?xml version="1.0" encoding="utf-8"?>
+<file path=ppt/slides/slide22.xml><?xml version="1.0" encoding="utf-8"?>
 <p:sld xmlns:a="http://schemas.openxmlformats.org/drawingml/2006/main" xmlns:r="http://schemas.openxmlformats.org/officeDocument/2006/relationships" xmlns:p="http://schemas.openxmlformats.org/presentationml/2006/main">
   <p:cSld>
     <p:bg>
@@ -18183,273 +19807,7 @@
 </p:sld>
 </file>
 
-<file path=ppt/slides/slide2.xml><?xml version="1.0" encoding="utf-8"?>
-<p:sld xmlns:a="http://schemas.openxmlformats.org/drawingml/2006/main" xmlns:r="http://schemas.openxmlformats.org/officeDocument/2006/relationships" xmlns:p="http://schemas.openxmlformats.org/presentationml/2006/main">
-  <p:cSld>
-    <p:bg>
-      <p:bgPr>
-        <a:solidFill>
-          <a:schemeClr val="bg1"/>
-        </a:solidFill>
-        <a:effectLst/>
-      </p:bgPr>
-    </p:bg>
-    <p:spTree>
-      <p:nvGrpSpPr>
-        <p:cNvPr id="1" name=""/>
-        <p:cNvGrpSpPr/>
-        <p:nvPr/>
-      </p:nvGrpSpPr>
-      <p:grpSpPr>
-        <a:xfrm>
-          <a:off x="0" y="0"/>
-          <a:ext cx="0" cy="0"/>
-          <a:chOff x="0" y="0"/>
-          <a:chExt cx="0" cy="0"/>
-        </a:xfrm>
-      </p:grpSpPr>
-      <p:sp>
-        <p:nvSpPr>
-          <p:cNvPr id="55" name="Rectangle 54">
-            <a:extLst>
-              <a:ext uri="{FF2B5EF4-FFF2-40B4-BE49-F238E27FC236}">
-                <a16:creationId xmlns:a16="http://schemas.microsoft.com/office/drawing/2014/main" id="{C5E6CFF1-2F42-4E10-9A97-F116F46F53FE}"/>
-              </a:ext>
-              <a:ext uri="{C183D7F6-B498-43B3-948B-1728B52AA6E4}">
-                <adec:decorative xmlns:adec="http://schemas.microsoft.com/office/drawing/2017/decorative" val="1"/>
-              </a:ext>
-            </a:extLst>
-          </p:cNvPr>
-          <p:cNvSpPr>
-            <a:spLocks noGrp="1" noRot="1" noChangeAspect="1" noMove="1" noResize="1" noEditPoints="1" noAdjustHandles="1" noChangeArrowheads="1" noChangeShapeType="1" noTextEdit="1"/>
-          </p:cNvSpPr>
-          <p:nvPr>
-            <p:extLst>
-              <p:ext uri="{386F3935-93C4-4BCD-93E2-E3B085C9AB24}">
-                <p16:designElem xmlns:p16="http://schemas.microsoft.com/office/powerpoint/2015/main" val="1"/>
-              </p:ext>
-            </p:extLst>
-          </p:nvPr>
-        </p:nvSpPr>
-        <p:spPr>
-          <a:xfrm>
-            <a:off x="0" y="0"/>
-            <a:ext cx="12192000" cy="6858000"/>
-          </a:xfrm>
-          <a:prstGeom prst="rect">
-            <a:avLst/>
-          </a:prstGeom>
-          <a:solidFill>
-            <a:srgbClr val="000000"/>
-          </a:solidFill>
-          <a:ln>
-            <a:noFill/>
-          </a:ln>
-        </p:spPr>
-        <p:style>
-          <a:lnRef idx="2">
-            <a:schemeClr val="accent1">
-              <a:shade val="50000"/>
-            </a:schemeClr>
-          </a:lnRef>
-          <a:fillRef idx="1">
-            <a:schemeClr val="accent1"/>
-          </a:fillRef>
-          <a:effectRef idx="0">
-            <a:schemeClr val="accent1"/>
-          </a:effectRef>
-          <a:fontRef idx="minor">
-            <a:schemeClr val="lt1"/>
-          </a:fontRef>
-        </p:style>
-        <p:txBody>
-          <a:bodyPr rtlCol="0" anchor="ctr"/>
-          <a:lstStyle/>
-          <a:p>
-            <a:pPr algn="ctr"/>
-            <a:endParaRPr lang="en-US"/>
-          </a:p>
-        </p:txBody>
-      </p:sp>
-      <p:pic>
-        <p:nvPicPr>
-          <p:cNvPr id="12" name="Picture 4" descr="Glasses on top of a book">
-            <a:extLst>
-              <a:ext uri="{FF2B5EF4-FFF2-40B4-BE49-F238E27FC236}">
-                <a16:creationId xmlns:a16="http://schemas.microsoft.com/office/drawing/2014/main" id="{7AA70AC1-119E-D28F-0547-20193109F92C}"/>
-              </a:ext>
-            </a:extLst>
-          </p:cNvPr>
-          <p:cNvPicPr>
-            <a:picLocks noChangeAspect="1"/>
-          </p:cNvPicPr>
-          <p:nvPr/>
-        </p:nvPicPr>
-        <p:blipFill rotWithShape="1">
-          <a:blip r:embed="rId2">
-            <a:alphaModFix amt="35000"/>
-          </a:blip>
-          <a:srcRect t="13324" b="1770"/>
-          <a:stretch/>
-        </p:blipFill>
-        <p:spPr>
-          <a:xfrm>
-            <a:off x="20" y="1"/>
-            <a:ext cx="12191980" cy="6857999"/>
-          </a:xfrm>
-          <a:prstGeom prst="rect">
-            <a:avLst/>
-          </a:prstGeom>
-        </p:spPr>
-      </p:pic>
-      <p:sp>
-        <p:nvSpPr>
-          <p:cNvPr id="2" name="Title 1">
-            <a:extLst>
-              <a:ext uri="{FF2B5EF4-FFF2-40B4-BE49-F238E27FC236}">
-                <a16:creationId xmlns:a16="http://schemas.microsoft.com/office/drawing/2014/main" id="{316297CF-43EE-01CB-C9FD-9EDD789F5735}"/>
-              </a:ext>
-            </a:extLst>
-          </p:cNvPr>
-          <p:cNvSpPr>
-            <a:spLocks noGrp="1"/>
-          </p:cNvSpPr>
-          <p:nvPr>
-            <p:ph type="title"/>
-          </p:nvPr>
-        </p:nvSpPr>
-        <p:spPr>
-          <a:xfrm>
-            <a:off x="838199" y="1065862"/>
-            <a:ext cx="6052955" cy="4726276"/>
-          </a:xfrm>
-        </p:spPr>
-        <p:txBody>
-          <a:bodyPr>
-            <a:normAutofit/>
-          </a:bodyPr>
-          <a:lstStyle/>
-          <a:p>
-            <a:pPr algn="r"/>
-            <a:r>
-              <a:rPr lang="en-US" sz="8000" dirty="0">
-                <a:ln w="22225">
-                  <a:solidFill>
-                    <a:srgbClr val="FFFFFF"/>
-                  </a:solidFill>
-                </a:ln>
-                <a:noFill/>
-              </a:rPr>
-              <a:t>Tell me</a:t>
-            </a:r>
-            <a:endParaRPr lang="en-NZ" sz="8000" dirty="0">
-              <a:ln w="22225">
-                <a:solidFill>
-                  <a:srgbClr val="FFFFFF"/>
-                </a:solidFill>
-              </a:ln>
-              <a:noFill/>
-            </a:endParaRPr>
-          </a:p>
-        </p:txBody>
-      </p:sp>
-      <p:cxnSp>
-        <p:nvCxnSpPr>
-          <p:cNvPr id="57" name="Straight Connector 56">
-            <a:extLst>
-              <a:ext uri="{FF2B5EF4-FFF2-40B4-BE49-F238E27FC236}">
-                <a16:creationId xmlns:a16="http://schemas.microsoft.com/office/drawing/2014/main" id="{96A8629B-8289-498B-939B-1CA0C106182C}"/>
-              </a:ext>
-              <a:ext uri="{C183D7F6-B498-43B3-948B-1728B52AA6E4}">
-                <adec:decorative xmlns:adec="http://schemas.microsoft.com/office/drawing/2017/decorative" val="1"/>
-              </a:ext>
-            </a:extLst>
-          </p:cNvPr>
-          <p:cNvCxnSpPr>
-            <a:cxnSpLocks noGrp="1" noRot="1" noChangeAspect="1" noMove="1" noResize="1" noEditPoints="1" noAdjustHandles="1" noChangeArrowheads="1" noChangeShapeType="1"/>
-          </p:cNvCxnSpPr>
-          <p:nvPr>
-            <p:extLst>
-              <p:ext uri="{386F3935-93C4-4BCD-93E2-E3B085C9AB24}">
-                <p16:designElem xmlns:p16="http://schemas.microsoft.com/office/powerpoint/2015/main" val="1"/>
-              </p:ext>
-            </p:extLst>
-          </p:nvPr>
-        </p:nvCxnSpPr>
-        <p:spPr>
-          <a:xfrm>
-            <a:off x="7212899" y="2286000"/>
-            <a:ext cx="0" cy="2286000"/>
-          </a:xfrm>
-          <a:prstGeom prst="line">
-            <a:avLst/>
-          </a:prstGeom>
-          <a:ln w="15875">
-            <a:solidFill>
-              <a:srgbClr val="FFFFFF"/>
-            </a:solidFill>
-          </a:ln>
-        </p:spPr>
-        <p:style>
-          <a:lnRef idx="1">
-            <a:schemeClr val="accent1"/>
-          </a:lnRef>
-          <a:fillRef idx="0">
-            <a:schemeClr val="accent1"/>
-          </a:fillRef>
-          <a:effectRef idx="0">
-            <a:schemeClr val="accent1"/>
-          </a:effectRef>
-          <a:fontRef idx="minor">
-            <a:schemeClr val="tx1"/>
-          </a:fontRef>
-        </p:style>
-      </p:cxnSp>
-      <p:graphicFrame>
-        <p:nvGraphicFramePr>
-          <p:cNvPr id="35" name="Content Placeholder 2">
-            <a:extLst>
-              <a:ext uri="{FF2B5EF4-FFF2-40B4-BE49-F238E27FC236}">
-                <a16:creationId xmlns:a16="http://schemas.microsoft.com/office/drawing/2014/main" id="{9380F06F-3A1E-08A3-74C8-E66A6A643448}"/>
-              </a:ext>
-            </a:extLst>
-          </p:cNvPr>
-          <p:cNvGraphicFramePr>
-            <a:graphicFrameLocks noGrp="1"/>
-          </p:cNvGraphicFramePr>
-          <p:nvPr>
-            <p:ph idx="1"/>
-            <p:extLst>
-              <p:ext uri="{D42A27DB-BD31-4B8C-83A1-F6EECF244321}">
-                <p14:modId xmlns:p14="http://schemas.microsoft.com/office/powerpoint/2010/main" val="2045123527"/>
-              </p:ext>
-            </p:extLst>
-          </p:nvPr>
-        </p:nvGraphicFramePr>
-        <p:xfrm>
-          <a:off x="7534641" y="1065862"/>
-          <a:ext cx="3860002" cy="4726276"/>
-        </p:xfrm>
-        <a:graphic>
-          <a:graphicData uri="http://schemas.openxmlformats.org/drawingml/2006/diagram">
-            <dgm:relIds xmlns:dgm="http://schemas.openxmlformats.org/drawingml/2006/diagram" xmlns:r="http://schemas.openxmlformats.org/officeDocument/2006/relationships" r:dm="rId3" r:lo="rId4" r:qs="rId5" r:cs="rId6"/>
-          </a:graphicData>
-        </a:graphic>
-      </p:graphicFrame>
-    </p:spTree>
-    <p:extLst>
-      <p:ext uri="{BB962C8B-B14F-4D97-AF65-F5344CB8AC3E}">
-        <p14:creationId xmlns:p14="http://schemas.microsoft.com/office/powerpoint/2010/main" val="1294787981"/>
-      </p:ext>
-    </p:extLst>
-  </p:cSld>
-  <p:clrMapOvr>
-    <a:overrideClrMapping bg1="dk1" tx1="lt1" bg2="dk2" tx2="lt2" accent1="accent1" accent2="accent2" accent3="accent3" accent4="accent4" accent5="accent5" accent6="accent6" hlink="hlink" folHlink="folHlink"/>
-  </p:clrMapOvr>
-</p:sld>
-</file>
-
-<file path=ppt/slides/slide3.xml><?xml version="1.0" encoding="utf-8"?>
+<file path=ppt/slides/slide23.xml><?xml version="1.0" encoding="utf-8"?>
 <p:sld xmlns:a="http://schemas.openxmlformats.org/drawingml/2006/main" xmlns:r="http://schemas.openxmlformats.org/officeDocument/2006/relationships" xmlns:p="http://schemas.openxmlformats.org/presentationml/2006/main">
   <p:cSld>
     <p:bg>
@@ -18476,10 +19834,10 @@
       </p:grpSpPr>
       <p:sp useBgFill="1">
         <p:nvSpPr>
-          <p:cNvPr id="18" name="Rectangle 17">
+          <p:cNvPr id="8" name="Rectangle 7">
             <a:extLst>
               <a:ext uri="{FF2B5EF4-FFF2-40B4-BE49-F238E27FC236}">
-                <a16:creationId xmlns:a16="http://schemas.microsoft.com/office/drawing/2014/main" id="{12609869-9E80-471B-A487-A53288E0E791}"/>
+                <a16:creationId xmlns:a16="http://schemas.microsoft.com/office/drawing/2014/main" id="{09588DA8-065E-4F6F-8EFD-43104AB2E0CF}"/>
               </a:ext>
               <a:ext uri="{C183D7F6-B498-43B3-948B-1728B52AA6E4}">
                 <adec:decorative xmlns:adec="http://schemas.microsoft.com/office/drawing/2017/decorative" val="1"/>
@@ -18550,6 +19908,740 @@
           </a:p>
         </p:txBody>
       </p:sp>
+      <p:sp useBgFill="1">
+        <p:nvSpPr>
+          <p:cNvPr id="10" name="Rectangle 9">
+            <a:extLst>
+              <a:ext uri="{FF2B5EF4-FFF2-40B4-BE49-F238E27FC236}">
+                <a16:creationId xmlns:a16="http://schemas.microsoft.com/office/drawing/2014/main" id="{C4285719-470E-454C-AF62-8323075F1F5B}"/>
+              </a:ext>
+              <a:ext uri="{C183D7F6-B498-43B3-948B-1728B52AA6E4}">
+                <adec:decorative xmlns:adec="http://schemas.microsoft.com/office/drawing/2017/decorative" val="1"/>
+              </a:ext>
+            </a:extLst>
+          </p:cNvPr>
+          <p:cNvSpPr>
+            <a:spLocks noGrp="1" noRot="1" noChangeAspect="1" noMove="1" noResize="1" noEditPoints="1" noAdjustHandles="1" noChangeArrowheads="1" noChangeShapeType="1" noTextEdit="1"/>
+          </p:cNvSpPr>
+          <p:nvPr>
+            <p:extLst>
+              <p:ext uri="{386F3935-93C4-4BCD-93E2-E3B085C9AB24}">
+                <p16:designElem xmlns:p16="http://schemas.microsoft.com/office/powerpoint/2015/main" val="1"/>
+              </p:ext>
+            </p:extLst>
+          </p:nvPr>
+        </p:nvSpPr>
+        <p:spPr>
+          <a:xfrm>
+            <a:off x="0" y="0"/>
+            <a:ext cx="12188952" cy="6858000"/>
+          </a:xfrm>
+          <a:prstGeom prst="rect">
+            <a:avLst/>
+          </a:prstGeom>
+          <a:ln w="12700" cap="flat" cmpd="sng" algn="ctr">
+            <a:noFill/>
+            <a:prstDash val="solid"/>
+            <a:miter lim="800000"/>
+          </a:ln>
+          <a:effectLst/>
+          <a:extLst>
+            <a:ext uri="{91240B29-F687-4F45-9708-019B960494DF}">
+              <a14:hiddenLine xmlns:a14="http://schemas.microsoft.com/office/drawing/2010/main" w="12700" cap="flat" cmpd="sng" algn="ctr">
+                <a:solidFill>
+                  <a:schemeClr val="accent1">
+                    <a:shade val="50000"/>
+                  </a:schemeClr>
+                </a:solidFill>
+                <a:prstDash val="solid"/>
+                <a:miter lim="800000"/>
+              </a14:hiddenLine>
+            </a:ext>
+          </a:extLst>
+        </p:spPr>
+        <p:style>
+          <a:lnRef idx="2">
+            <a:schemeClr val="accent1">
+              <a:shade val="50000"/>
+            </a:schemeClr>
+          </a:lnRef>
+          <a:fillRef idx="1">
+            <a:schemeClr val="accent1"/>
+          </a:fillRef>
+          <a:effectRef idx="0">
+            <a:schemeClr val="accent1"/>
+          </a:effectRef>
+          <a:fontRef idx="minor">
+            <a:schemeClr val="lt1"/>
+          </a:fontRef>
+        </p:style>
+        <p:txBody>
+          <a:bodyPr rtlCol="0" anchor="ctr"/>
+          <a:lstStyle/>
+          <a:p>
+            <a:pPr algn="ctr"/>
+            <a:endParaRPr lang="en-US"/>
+          </a:p>
+        </p:txBody>
+      </p:sp>
+      <p:sp>
+        <p:nvSpPr>
+          <p:cNvPr id="12" name="Rectangle 11">
+            <a:extLst>
+              <a:ext uri="{FF2B5EF4-FFF2-40B4-BE49-F238E27FC236}">
+                <a16:creationId xmlns:a16="http://schemas.microsoft.com/office/drawing/2014/main" id="{CD9FE4EF-C4D8-49A0-B2FF-81D8DB7D8A24}"/>
+              </a:ext>
+              <a:ext uri="{C183D7F6-B498-43B3-948B-1728B52AA6E4}">
+                <adec:decorative xmlns:adec="http://schemas.microsoft.com/office/drawing/2017/decorative" val="1"/>
+              </a:ext>
+            </a:extLst>
+          </p:cNvPr>
+          <p:cNvSpPr>
+            <a:spLocks noGrp="1" noRot="1" noChangeAspect="1" noMove="1" noResize="1" noEditPoints="1" noAdjustHandles="1" noChangeArrowheads="1" noChangeShapeType="1" noTextEdit="1"/>
+          </p:cNvSpPr>
+          <p:nvPr>
+            <p:extLst>
+              <p:ext uri="{386F3935-93C4-4BCD-93E2-E3B085C9AB24}">
+                <p16:designElem xmlns:p16="http://schemas.microsoft.com/office/powerpoint/2015/main" val="1"/>
+              </p:ext>
+            </p:extLst>
+          </p:nvPr>
+        </p:nvSpPr>
+        <p:spPr>
+          <a:xfrm rot="5400000" flipH="1">
+            <a:off x="-1410084" y="1410082"/>
+            <a:ext cx="6858000" cy="4037836"/>
+          </a:xfrm>
+          <a:prstGeom prst="rect">
+            <a:avLst/>
+          </a:prstGeom>
+          <a:gradFill>
+            <a:gsLst>
+              <a:gs pos="8000">
+                <a:srgbClr val="000000"/>
+              </a:gs>
+              <a:gs pos="100000">
+                <a:schemeClr val="accent1">
+                  <a:lumMod val="75000"/>
+                </a:schemeClr>
+              </a:gs>
+            </a:gsLst>
+            <a:lin ang="3000000" scaled="0"/>
+          </a:gradFill>
+          <a:ln>
+            <a:noFill/>
+          </a:ln>
+        </p:spPr>
+        <p:style>
+          <a:lnRef idx="2">
+            <a:schemeClr val="accent1">
+              <a:shade val="50000"/>
+            </a:schemeClr>
+          </a:lnRef>
+          <a:fillRef idx="1">
+            <a:schemeClr val="accent1"/>
+          </a:fillRef>
+          <a:effectRef idx="0">
+            <a:schemeClr val="accent1"/>
+          </a:effectRef>
+          <a:fontRef idx="minor">
+            <a:schemeClr val="lt1"/>
+          </a:fontRef>
+        </p:style>
+        <p:txBody>
+          <a:bodyPr rtlCol="0" anchor="ctr"/>
+          <a:lstStyle/>
+          <a:p>
+            <a:pPr algn="ctr"/>
+            <a:endParaRPr lang="en-US"/>
+          </a:p>
+        </p:txBody>
+      </p:sp>
+      <p:sp>
+        <p:nvSpPr>
+          <p:cNvPr id="14" name="Rectangle 13">
+            <a:extLst>
+              <a:ext uri="{FF2B5EF4-FFF2-40B4-BE49-F238E27FC236}">
+                <a16:creationId xmlns:a16="http://schemas.microsoft.com/office/drawing/2014/main" id="{4300840D-0A0B-4512-BACA-B439D5B9C57C}"/>
+              </a:ext>
+              <a:ext uri="{C183D7F6-B498-43B3-948B-1728B52AA6E4}">
+                <adec:decorative xmlns:adec="http://schemas.microsoft.com/office/drawing/2017/decorative" val="1"/>
+              </a:ext>
+            </a:extLst>
+          </p:cNvPr>
+          <p:cNvSpPr>
+            <a:spLocks noGrp="1" noRot="1" noChangeAspect="1" noMove="1" noResize="1" noEditPoints="1" noAdjustHandles="1" noChangeArrowheads="1" noChangeShapeType="1" noTextEdit="1"/>
+          </p:cNvSpPr>
+          <p:nvPr>
+            <p:extLst>
+              <p:ext uri="{386F3935-93C4-4BCD-93E2-E3B085C9AB24}">
+                <p16:designElem xmlns:p16="http://schemas.microsoft.com/office/powerpoint/2015/main" val="1"/>
+              </p:ext>
+            </p:extLst>
+          </p:nvPr>
+        </p:nvSpPr>
+        <p:spPr>
+          <a:xfrm rot="5400000" flipH="1">
+            <a:off x="-1410085" y="1420219"/>
+            <a:ext cx="6857999" cy="4037839"/>
+          </a:xfrm>
+          <a:prstGeom prst="rect">
+            <a:avLst/>
+          </a:prstGeom>
+          <a:gradFill>
+            <a:gsLst>
+              <a:gs pos="0">
+                <a:srgbClr val="000000">
+                  <a:alpha val="0"/>
+                </a:srgbClr>
+              </a:gs>
+              <a:gs pos="99000">
+                <a:schemeClr val="accent1">
+                  <a:alpha val="46000"/>
+                </a:schemeClr>
+              </a:gs>
+            </a:gsLst>
+            <a:lin ang="1800000" scaled="0"/>
+          </a:gradFill>
+          <a:ln>
+            <a:noFill/>
+          </a:ln>
+        </p:spPr>
+        <p:style>
+          <a:lnRef idx="2">
+            <a:schemeClr val="accent1">
+              <a:shade val="50000"/>
+            </a:schemeClr>
+          </a:lnRef>
+          <a:fillRef idx="1">
+            <a:schemeClr val="accent1"/>
+          </a:fillRef>
+          <a:effectRef idx="0">
+            <a:schemeClr val="accent1"/>
+          </a:effectRef>
+          <a:fontRef idx="minor">
+            <a:schemeClr val="lt1"/>
+          </a:fontRef>
+        </p:style>
+        <p:txBody>
+          <a:bodyPr rtlCol="0" anchor="ctr"/>
+          <a:lstStyle/>
+          <a:p>
+            <a:pPr algn="ctr"/>
+            <a:endParaRPr lang="en-US"/>
+          </a:p>
+        </p:txBody>
+      </p:sp>
+      <p:sp>
+        <p:nvSpPr>
+          <p:cNvPr id="16" name="Rectangle 15">
+            <a:extLst>
+              <a:ext uri="{FF2B5EF4-FFF2-40B4-BE49-F238E27FC236}">
+                <a16:creationId xmlns:a16="http://schemas.microsoft.com/office/drawing/2014/main" id="{D2B78728-A580-49A7-84F9-6EF6F583ADE0}"/>
+              </a:ext>
+              <a:ext uri="{C183D7F6-B498-43B3-948B-1728B52AA6E4}">
+                <adec:decorative xmlns:adec="http://schemas.microsoft.com/office/drawing/2017/decorative" val="1"/>
+              </a:ext>
+            </a:extLst>
+          </p:cNvPr>
+          <p:cNvSpPr>
+            <a:spLocks noGrp="1" noRot="1" noChangeAspect="1" noMove="1" noResize="1" noEditPoints="1" noAdjustHandles="1" noChangeArrowheads="1" noChangeShapeType="1" noTextEdit="1"/>
+          </p:cNvSpPr>
+          <p:nvPr>
+            <p:extLst>
+              <p:ext uri="{386F3935-93C4-4BCD-93E2-E3B085C9AB24}">
+                <p16:designElem xmlns:p16="http://schemas.microsoft.com/office/powerpoint/2015/main" val="1"/>
+              </p:ext>
+            </p:extLst>
+          </p:nvPr>
+        </p:nvSpPr>
+        <p:spPr>
+          <a:xfrm rot="5400000" flipH="1">
+            <a:off x="767923" y="3588085"/>
+            <a:ext cx="2501979" cy="4037841"/>
+          </a:xfrm>
+          <a:prstGeom prst="rect">
+            <a:avLst/>
+          </a:prstGeom>
+          <a:gradFill>
+            <a:gsLst>
+              <a:gs pos="2000">
+                <a:schemeClr val="accent1">
+                  <a:alpha val="29000"/>
+                </a:schemeClr>
+              </a:gs>
+              <a:gs pos="100000">
+                <a:srgbClr val="000000">
+                  <a:alpha val="30000"/>
+                </a:srgbClr>
+              </a:gs>
+            </a:gsLst>
+            <a:lin ang="7800000" scaled="0"/>
+          </a:gradFill>
+          <a:ln>
+            <a:noFill/>
+          </a:ln>
+        </p:spPr>
+        <p:style>
+          <a:lnRef idx="2">
+            <a:schemeClr val="accent1">
+              <a:shade val="50000"/>
+            </a:schemeClr>
+          </a:lnRef>
+          <a:fillRef idx="1">
+            <a:schemeClr val="accent1"/>
+          </a:fillRef>
+          <a:effectRef idx="0">
+            <a:schemeClr val="accent1"/>
+          </a:effectRef>
+          <a:fontRef idx="minor">
+            <a:schemeClr val="lt1"/>
+          </a:fontRef>
+        </p:style>
+        <p:txBody>
+          <a:bodyPr rtlCol="0" anchor="ctr"/>
+          <a:lstStyle/>
+          <a:p>
+            <a:pPr algn="ctr"/>
+            <a:endParaRPr lang="en-US" dirty="0"/>
+          </a:p>
+        </p:txBody>
+      </p:sp>
+      <p:sp>
+        <p:nvSpPr>
+          <p:cNvPr id="18" name="Freeform: Shape 17">
+            <a:extLst>
+              <a:ext uri="{FF2B5EF4-FFF2-40B4-BE49-F238E27FC236}">
+                <a16:creationId xmlns:a16="http://schemas.microsoft.com/office/drawing/2014/main" id="{38FAA1A1-D861-433F-88FA-1E9D6FD31D11}"/>
+              </a:ext>
+              <a:ext uri="{C183D7F6-B498-43B3-948B-1728B52AA6E4}">
+                <adec:decorative xmlns:adec="http://schemas.microsoft.com/office/drawing/2017/decorative" val="1"/>
+              </a:ext>
+            </a:extLst>
+          </p:cNvPr>
+          <p:cNvSpPr>
+            <a:spLocks noGrp="1" noRot="1" noChangeAspect="1" noMove="1" noResize="1" noEditPoints="1" noAdjustHandles="1" noChangeArrowheads="1" noChangeShapeType="1" noTextEdit="1"/>
+          </p:cNvSpPr>
+          <p:nvPr>
+            <p:extLst>
+              <p:ext uri="{386F3935-93C4-4BCD-93E2-E3B085C9AB24}">
+                <p16:designElem xmlns:p16="http://schemas.microsoft.com/office/powerpoint/2015/main" val="1"/>
+              </p:ext>
+            </p:extLst>
+          </p:nvPr>
+        </p:nvSpPr>
+        <p:spPr>
+          <a:xfrm rot="20635413">
+            <a:off x="-501737" y="969718"/>
+            <a:ext cx="3900357" cy="4178958"/>
+          </a:xfrm>
+          <a:custGeom>
+            <a:avLst/>
+            <a:gdLst>
+              <a:gd name="connsiteX0" fmla="*/ 2432225 w 3900357"/>
+              <a:gd name="connsiteY0" fmla="*/ 93939 h 4178958"/>
+              <a:gd name="connsiteX1" fmla="*/ 3900357 w 3900357"/>
+              <a:gd name="connsiteY1" fmla="*/ 2089479 h 4178958"/>
+              <a:gd name="connsiteX2" fmla="*/ 1810878 w 3900357"/>
+              <a:gd name="connsiteY2" fmla="*/ 4178958 h 4178958"/>
+              <a:gd name="connsiteX3" fmla="*/ 78249 w 3900357"/>
+              <a:gd name="connsiteY3" fmla="*/ 3257727 h 4178958"/>
+              <a:gd name="connsiteX4" fmla="*/ 0 w 3900357"/>
+              <a:gd name="connsiteY4" fmla="*/ 3128923 h 4178958"/>
+              <a:gd name="connsiteX5" fmla="*/ 831324 w 3900357"/>
+              <a:gd name="connsiteY5" fmla="*/ 244281 h 4178958"/>
+              <a:gd name="connsiteX6" fmla="*/ 997559 w 3900357"/>
+              <a:gd name="connsiteY6" fmla="*/ 164202 h 4178958"/>
+              <a:gd name="connsiteX7" fmla="*/ 1810878 w 3900357"/>
+              <a:gd name="connsiteY7" fmla="*/ 0 h 4178958"/>
+              <a:gd name="connsiteX8" fmla="*/ 2432225 w 3900357"/>
+              <a:gd name="connsiteY8" fmla="*/ 93939 h 4178958"/>
+            </a:gdLst>
+            <a:ahLst/>
+            <a:cxnLst>
+              <a:cxn ang="0">
+                <a:pos x="connsiteX0" y="connsiteY0"/>
+              </a:cxn>
+              <a:cxn ang="0">
+                <a:pos x="connsiteX1" y="connsiteY1"/>
+              </a:cxn>
+              <a:cxn ang="0">
+                <a:pos x="connsiteX2" y="connsiteY2"/>
+              </a:cxn>
+              <a:cxn ang="0">
+                <a:pos x="connsiteX3" y="connsiteY3"/>
+              </a:cxn>
+              <a:cxn ang="0">
+                <a:pos x="connsiteX4" y="connsiteY4"/>
+              </a:cxn>
+              <a:cxn ang="0">
+                <a:pos x="connsiteX5" y="connsiteY5"/>
+              </a:cxn>
+              <a:cxn ang="0">
+                <a:pos x="connsiteX6" y="connsiteY6"/>
+              </a:cxn>
+              <a:cxn ang="0">
+                <a:pos x="connsiteX7" y="connsiteY7"/>
+              </a:cxn>
+              <a:cxn ang="0">
+                <a:pos x="connsiteX8" y="connsiteY8"/>
+              </a:cxn>
+            </a:cxnLst>
+            <a:rect l="l" t="t" r="r" b="b"/>
+            <a:pathLst>
+              <a:path w="3900357" h="4178958">
+                <a:moveTo>
+                  <a:pt x="2432225" y="93939"/>
+                </a:moveTo>
+                <a:cubicBezTo>
+                  <a:pt x="3282786" y="358491"/>
+                  <a:pt x="3900357" y="1151865"/>
+                  <a:pt x="3900357" y="2089479"/>
+                </a:cubicBezTo>
+                <a:cubicBezTo>
+                  <a:pt x="3900357" y="3243466"/>
+                  <a:pt x="2964865" y="4178958"/>
+                  <a:pt x="1810878" y="4178958"/>
+                </a:cubicBezTo>
+                <a:cubicBezTo>
+                  <a:pt x="1089636" y="4178958"/>
+                  <a:pt x="453744" y="3813531"/>
+                  <a:pt x="78249" y="3257727"/>
+                </a:cubicBezTo>
+                <a:lnTo>
+                  <a:pt x="0" y="3128923"/>
+                </a:lnTo>
+                <a:lnTo>
+                  <a:pt x="831324" y="244281"/>
+                </a:lnTo>
+                <a:lnTo>
+                  <a:pt x="997559" y="164202"/>
+                </a:lnTo>
+                <a:cubicBezTo>
+                  <a:pt x="1247540" y="58468"/>
+                  <a:pt x="1522381" y="0"/>
+                  <a:pt x="1810878" y="0"/>
+                </a:cubicBezTo>
+                <a:cubicBezTo>
+                  <a:pt x="2027251" y="0"/>
+                  <a:pt x="2235942" y="32888"/>
+                  <a:pt x="2432225" y="93939"/>
+                </a:cubicBezTo>
+                <a:close/>
+              </a:path>
+            </a:pathLst>
+          </a:custGeom>
+          <a:gradFill>
+            <a:gsLst>
+              <a:gs pos="29000">
+                <a:srgbClr val="000000">
+                  <a:alpha val="0"/>
+                </a:srgbClr>
+              </a:gs>
+              <a:gs pos="100000">
+                <a:schemeClr val="accent1">
+                  <a:alpha val="43000"/>
+                </a:schemeClr>
+              </a:gs>
+            </a:gsLst>
+            <a:lin ang="1800000" scaled="0"/>
+          </a:gradFill>
+          <a:ln>
+            <a:noFill/>
+          </a:ln>
+        </p:spPr>
+        <p:style>
+          <a:lnRef idx="2">
+            <a:schemeClr val="accent1">
+              <a:shade val="50000"/>
+            </a:schemeClr>
+          </a:lnRef>
+          <a:fillRef idx="1">
+            <a:schemeClr val="accent1"/>
+          </a:fillRef>
+          <a:effectRef idx="0">
+            <a:schemeClr val="accent1"/>
+          </a:effectRef>
+          <a:fontRef idx="minor">
+            <a:schemeClr val="lt1"/>
+          </a:fontRef>
+        </p:style>
+        <p:txBody>
+          <a:bodyPr wrap="square" rtlCol="0" anchor="ctr">
+            <a:noAutofit/>
+          </a:bodyPr>
+          <a:lstStyle/>
+          <a:p>
+            <a:pPr algn="ctr"/>
+            <a:endParaRPr lang="en-US" dirty="0"/>
+          </a:p>
+        </p:txBody>
+      </p:sp>
+      <p:sp>
+        <p:nvSpPr>
+          <p:cNvPr id="20" name="Rectangle 19">
+            <a:extLst>
+              <a:ext uri="{FF2B5EF4-FFF2-40B4-BE49-F238E27FC236}">
+                <a16:creationId xmlns:a16="http://schemas.microsoft.com/office/drawing/2014/main" id="{8D71EDA1-87BF-4D5D-AB79-F346FD19278A}"/>
+              </a:ext>
+              <a:ext uri="{C183D7F6-B498-43B3-948B-1728B52AA6E4}">
+                <adec:decorative xmlns:adec="http://schemas.microsoft.com/office/drawing/2017/decorative" val="1"/>
+              </a:ext>
+            </a:extLst>
+          </p:cNvPr>
+          <p:cNvSpPr>
+            <a:spLocks noGrp="1" noRot="1" noChangeAspect="1" noMove="1" noResize="1" noEditPoints="1" noAdjustHandles="1" noChangeArrowheads="1" noChangeShapeType="1" noTextEdit="1"/>
+          </p:cNvSpPr>
+          <p:nvPr>
+            <p:extLst>
+              <p:ext uri="{386F3935-93C4-4BCD-93E2-E3B085C9AB24}">
+                <p16:designElem xmlns:p16="http://schemas.microsoft.com/office/powerpoint/2015/main" val="1"/>
+              </p:ext>
+            </p:extLst>
+          </p:nvPr>
+        </p:nvSpPr>
+        <p:spPr>
+          <a:xfrm rot="5400000" flipH="1">
+            <a:off x="-1410093" y="1399943"/>
+            <a:ext cx="6858003" cy="4037835"/>
+          </a:xfrm>
+          <a:prstGeom prst="rect">
+            <a:avLst/>
+          </a:prstGeom>
+          <a:gradFill>
+            <a:gsLst>
+              <a:gs pos="0">
+                <a:srgbClr val="000000">
+                  <a:alpha val="0"/>
+                </a:srgbClr>
+              </a:gs>
+              <a:gs pos="99000">
+                <a:schemeClr val="accent1">
+                  <a:lumMod val="60000"/>
+                  <a:lumOff val="40000"/>
+                  <a:alpha val="11000"/>
+                </a:schemeClr>
+              </a:gs>
+            </a:gsLst>
+            <a:lin ang="7200000" scaled="0"/>
+          </a:gradFill>
+          <a:ln>
+            <a:noFill/>
+          </a:ln>
+        </p:spPr>
+        <p:style>
+          <a:lnRef idx="2">
+            <a:schemeClr val="accent1">
+              <a:shade val="50000"/>
+            </a:schemeClr>
+          </a:lnRef>
+          <a:fillRef idx="1">
+            <a:schemeClr val="accent1"/>
+          </a:fillRef>
+          <a:effectRef idx="0">
+            <a:schemeClr val="accent1"/>
+          </a:effectRef>
+          <a:fontRef idx="minor">
+            <a:schemeClr val="lt1"/>
+          </a:fontRef>
+        </p:style>
+        <p:txBody>
+          <a:bodyPr rtlCol="0" anchor="ctr"/>
+          <a:lstStyle/>
+          <a:p>
+            <a:pPr algn="ctr"/>
+            <a:endParaRPr lang="en-US"/>
+          </a:p>
+        </p:txBody>
+      </p:sp>
+      <p:sp>
+        <p:nvSpPr>
+          <p:cNvPr id="2" name="Title 1">
+            <a:extLst>
+              <a:ext uri="{FF2B5EF4-FFF2-40B4-BE49-F238E27FC236}">
+                <a16:creationId xmlns:a16="http://schemas.microsoft.com/office/drawing/2014/main" id="{5D764CBA-A37D-54ED-C85A-2C1539BF55E9}"/>
+              </a:ext>
+            </a:extLst>
+          </p:cNvPr>
+          <p:cNvSpPr>
+            <a:spLocks noGrp="1"/>
+          </p:cNvSpPr>
+          <p:nvPr>
+            <p:ph type="title"/>
+          </p:nvPr>
+        </p:nvSpPr>
+        <p:spPr>
+          <a:xfrm>
+            <a:off x="466722" y="586855"/>
+            <a:ext cx="3201366" cy="3387497"/>
+          </a:xfrm>
+        </p:spPr>
+        <p:txBody>
+          <a:bodyPr anchor="b">
+            <a:normAutofit/>
+          </a:bodyPr>
+          <a:lstStyle/>
+          <a:p>
+            <a:pPr algn="r"/>
+            <a:r>
+              <a:rPr lang="en-US" sz="4000">
+                <a:solidFill>
+                  <a:srgbClr val="FFFFFF"/>
+                </a:solidFill>
+              </a:rPr>
+              <a:t>References</a:t>
+            </a:r>
+            <a:endParaRPr lang="en-NZ" sz="4000">
+              <a:solidFill>
+                <a:srgbClr val="FFFFFF"/>
+              </a:solidFill>
+            </a:endParaRPr>
+          </a:p>
+        </p:txBody>
+      </p:sp>
+      <p:pic>
+        <p:nvPicPr>
+          <p:cNvPr id="5" name="Content Placeholder 4">
+            <a:extLst>
+              <a:ext uri="{FF2B5EF4-FFF2-40B4-BE49-F238E27FC236}">
+                <a16:creationId xmlns:a16="http://schemas.microsoft.com/office/drawing/2014/main" id="{44B57880-F7CD-140C-4FAF-A4A30EEB5D7C}"/>
+              </a:ext>
+            </a:extLst>
+          </p:cNvPr>
+          <p:cNvPicPr>
+            <a:picLocks noGrp="1" noChangeAspect="1"/>
+          </p:cNvPicPr>
+          <p:nvPr>
+            <p:ph idx="1"/>
+          </p:nvPr>
+        </p:nvPicPr>
+        <p:blipFill>
+          <a:blip r:embed="rId2"/>
+          <a:stretch>
+            <a:fillRect/>
+          </a:stretch>
+        </p:blipFill>
+        <p:spPr>
+          <a:xfrm>
+            <a:off x="4504549" y="914399"/>
+            <a:ext cx="7220730" cy="5064369"/>
+          </a:xfrm>
+        </p:spPr>
+      </p:pic>
+    </p:spTree>
+    <p:extLst>
+      <p:ext uri="{BB962C8B-B14F-4D97-AF65-F5344CB8AC3E}">
+        <p14:creationId xmlns:p14="http://schemas.microsoft.com/office/powerpoint/2010/main" val="4045320355"/>
+      </p:ext>
+    </p:extLst>
+  </p:cSld>
+  <p:clrMapOvr>
+    <a:masterClrMapping/>
+  </p:clrMapOvr>
+</p:sld>
+</file>
+
+<file path=ppt/slides/slide3.xml><?xml version="1.0" encoding="utf-8"?>
+<p:sld xmlns:a="http://schemas.openxmlformats.org/drawingml/2006/main" xmlns:r="http://schemas.openxmlformats.org/officeDocument/2006/relationships" xmlns:p="http://schemas.openxmlformats.org/presentationml/2006/main">
+  <p:cSld>
+    <p:bg>
+      <p:bgPr>
+        <a:solidFill>
+          <a:schemeClr val="bg1"/>
+        </a:solidFill>
+        <a:effectLst/>
+      </p:bgPr>
+    </p:bg>
+    <p:spTree>
+      <p:nvGrpSpPr>
+        <p:cNvPr id="1" name=""/>
+        <p:cNvGrpSpPr/>
+        <p:nvPr/>
+      </p:nvGrpSpPr>
+      <p:grpSpPr>
+        <a:xfrm>
+          <a:off x="0" y="0"/>
+          <a:ext cx="0" cy="0"/>
+          <a:chOff x="0" y="0"/>
+          <a:chExt cx="0" cy="0"/>
+        </a:xfrm>
+      </p:grpSpPr>
+      <p:sp useBgFill="1">
+        <p:nvSpPr>
+          <p:cNvPr id="18" name="Rectangle 17">
+            <a:extLst>
+              <a:ext uri="{FF2B5EF4-FFF2-40B4-BE49-F238E27FC236}">
+                <a16:creationId xmlns:a16="http://schemas.microsoft.com/office/drawing/2014/main" id="{12609869-9E80-471B-A487-A53288E0E791}"/>
+              </a:ext>
+              <a:ext uri="{C183D7F6-B498-43B3-948B-1728B52AA6E4}">
+                <adec:decorative xmlns:adec="http://schemas.microsoft.com/office/drawing/2017/decorative" val="1"/>
+              </a:ext>
+            </a:extLst>
+          </p:cNvPr>
+          <p:cNvSpPr>
+            <a:spLocks noGrp="1" noRot="1" noChangeAspect="1" noMove="1" noResize="1" noEditPoints="1" noAdjustHandles="1" noChangeArrowheads="1" noChangeShapeType="1" noTextEdit="1"/>
+          </p:cNvSpPr>
+          <p:nvPr>
+            <p:extLst>
+              <p:ext uri="{386F3935-93C4-4BCD-93E2-E3B085C9AB24}">
+                <p16:designElem xmlns:p16="http://schemas.microsoft.com/office/powerpoint/2015/main" val="1"/>
+              </p:ext>
+            </p:extLst>
+          </p:nvPr>
+        </p:nvSpPr>
+        <p:spPr>
+          <a:xfrm>
+            <a:off x="0" y="0"/>
+            <a:ext cx="12192000" cy="6858000"/>
+          </a:xfrm>
+          <a:prstGeom prst="rect">
+            <a:avLst/>
+          </a:prstGeom>
+          <a:ln w="12700" cap="flat" cmpd="sng" algn="ctr">
+            <a:noFill/>
+            <a:prstDash val="solid"/>
+            <a:miter lim="800000"/>
+          </a:ln>
+          <a:effectLst/>
+          <a:extLst>
+            <a:ext uri="{91240B29-F687-4F45-9708-019B960494DF}">
+              <a14:hiddenLine xmlns:a14="http://schemas.microsoft.com/office/drawing/2010/main" w="12700" cap="flat" cmpd="sng" algn="ctr">
+                <a:solidFill>
+                  <a:schemeClr val="accent1">
+                    <a:shade val="50000"/>
+                  </a:schemeClr>
+                </a:solidFill>
+                <a:prstDash val="solid"/>
+                <a:miter lim="800000"/>
+              </a14:hiddenLine>
+            </a:ext>
+          </a:extLst>
+        </p:spPr>
+        <p:style>
+          <a:lnRef idx="2">
+            <a:schemeClr val="accent1">
+              <a:shade val="50000"/>
+            </a:schemeClr>
+          </a:lnRef>
+          <a:fillRef idx="1">
+            <a:schemeClr val="accent1"/>
+          </a:fillRef>
+          <a:effectRef idx="0">
+            <a:schemeClr val="accent1"/>
+          </a:effectRef>
+          <a:fontRef idx="minor">
+            <a:schemeClr val="lt1"/>
+          </a:fontRef>
+        </p:style>
+        <p:txBody>
+          <a:bodyPr rtlCol="0" anchor="ctr"/>
+          <a:lstStyle/>
+          <a:p>
+            <a:pPr algn="ctr"/>
+            <a:endParaRPr lang="en-US"/>
+          </a:p>
+        </p:txBody>
+      </p:sp>
       <p:sp>
         <p:nvSpPr>
           <p:cNvPr id="2" name="Title 1">
@@ -18615,60 +20707,54 @@
           <a:lstStyle/>
           <a:p>
             <a:r>
-              <a:rPr lang="en-US" sz="1900"/>
+              <a:rPr lang="en-US" sz="1900" dirty="0"/>
               <a:t>Report Structure</a:t>
             </a:r>
           </a:p>
           <a:p>
             <a:r>
-              <a:rPr lang="en-US" sz="1900"/>
+              <a:rPr lang="en-US" sz="1900" dirty="0"/>
               <a:t>Academic Reports vs. Technical Reports</a:t>
             </a:r>
           </a:p>
           <a:p>
             <a:r>
-              <a:rPr lang="en-US" sz="1900"/>
+              <a:rPr lang="en-US" sz="1900" dirty="0"/>
               <a:t>Using Images</a:t>
             </a:r>
           </a:p>
           <a:p>
             <a:r>
-              <a:rPr lang="en-US" sz="1900"/>
+              <a:rPr lang="en-US" sz="1900" dirty="0"/>
               <a:t>Plagiarism!</a:t>
             </a:r>
           </a:p>
           <a:p>
             <a:r>
-              <a:rPr lang="en-US" sz="1900"/>
+              <a:rPr lang="en-US" sz="1900" dirty="0"/>
               <a:t>Referencing</a:t>
             </a:r>
           </a:p>
           <a:p>
             <a:r>
-              <a:rPr lang="en-US" sz="1900"/>
-              <a:t>Do’s &amp; Don’ts</a:t>
-            </a:r>
-          </a:p>
-          <a:p>
-            <a:r>
-              <a:rPr lang="en-US" sz="1900"/>
+              <a:rPr lang="en-US" sz="1900" dirty="0"/>
               <a:t>General Advice</a:t>
             </a:r>
           </a:p>
           <a:p>
             <a:r>
-              <a:rPr lang="en-US" sz="1900"/>
+              <a:rPr lang="en-US" sz="1900" dirty="0"/>
               <a:t>Activities</a:t>
             </a:r>
           </a:p>
           <a:p>
             <a:r>
-              <a:rPr lang="en-US" sz="1900"/>
+              <a:rPr lang="en-US" sz="1900" dirty="0"/>
               <a:t>Questions</a:t>
             </a:r>
           </a:p>
           <a:p>
-            <a:endParaRPr lang="en-NZ" sz="1900"/>
+            <a:endParaRPr lang="en-NZ" sz="1900" dirty="0"/>
           </a:p>
         </p:txBody>
       </p:sp>

</xml_diff>